<commit_message>
added my slides to PP
</commit_message>
<xml_diff>
--- a/presentations/mid_PP/mid.pptx
+++ b/presentations/mid_PP/mid.pptx
@@ -5,32 +5,23 @@
     <p:sldMasterId id="2147483649" r:id="rId1"/>
   </p:sldMasterIdLst>
   <p:notesMasterIdLst>
-    <p:notesMasterId r:id="rId5"/>
+    <p:notesMasterId r:id="rId10"/>
   </p:notesMasterIdLst>
   <p:handoutMasterIdLst>
-    <p:handoutMasterId r:id="rId6"/>
+    <p:handoutMasterId r:id="rId11"/>
   </p:handoutMasterIdLst>
   <p:sldIdLst>
     <p:sldId id="576" r:id="rId2"/>
     <p:sldId id="523" r:id="rId3"/>
     <p:sldId id="558" r:id="rId4"/>
+    <p:sldId id="577" r:id="rId5"/>
+    <p:sldId id="578" r:id="rId6"/>
+    <p:sldId id="579" r:id="rId7"/>
+    <p:sldId id="580" r:id="rId8"/>
+    <p:sldId id="581" r:id="rId9"/>
   </p:sldIdLst>
   <p:sldSz cx="9144000" cy="6858000" type="screen4x3"/>
   <p:notesSz cx="6950075" cy="9236075"/>
-  <p:embeddedFontLst>
-    <p:embeddedFont>
-      <p:font typeface="Tahoma" panose="020B0604030504040204" pitchFamily="34" charset="0"/>
-      <p:regular r:id="rId7"/>
-      <p:bold r:id="rId8"/>
-    </p:embeddedFont>
-    <p:embeddedFont>
-      <p:font typeface="Verdana" panose="020B0604030504040204" pitchFamily="34" charset="0"/>
-      <p:regular r:id="rId9"/>
-      <p:bold r:id="rId10"/>
-      <p:italic r:id="rId11"/>
-      <p:boldItalic r:id="rId12"/>
-    </p:embeddedFont>
-  </p:embeddedFontLst>
   <p:defaultTextStyle>
     <a:defPPr>
       <a:defRPr lang="en-US"/>
@@ -158,7 +149,7 @@
   </p:defaultTextStyle>
   <p:extLst>
     <p:ext uri="{EFAFB233-063F-42B5-8137-9DF3F51BA10A}">
-      <p15:sldGuideLst xmlns:p15="http://schemas.microsoft.com/office/powerpoint/2012/main">
+      <p15:sldGuideLst xmlns:p15="http://schemas.microsoft.com/office/powerpoint/2012/main" xmlns="">
         <p15:guide id="1" orient="horz" pos="2160">
           <p15:clr>
             <a:srgbClr val="A4A3A4"/>
@@ -258,7 +249,7 @@
             <a:fld id="{3649C4A7-F7E0-4FB8-8F05-6ADADEF3AE08}" type="datetimeFigureOut">
               <a:rPr lang="en-US" smtClean="0"/>
               <a:pPr/>
-              <a:t>10/21/2015</a:t>
+              <a:t>10/22/15</a:t>
             </a:fld>
             <a:endParaRPr lang="en-US"/>
           </a:p>
@@ -3015,14 +3006,14 @@
           </a:ln>
           <a:effectLst/>
           <a:extLst>
-            <a:ext uri="{909E8E84-426E-40DD-AFC4-6F175D3DCCD1}">
+            <a:ext uri="{909E8E84-426E-40dd-AFC4-6F175D3DCCD1}">
               <a14:hiddenFill xmlns:a14="http://schemas.microsoft.com/office/drawing/2010/main">
                 <a:solidFill>
                   <a:schemeClr val="accent1"/>
                 </a:solidFill>
               </a14:hiddenFill>
             </a:ext>
-            <a:ext uri="{91240B29-F687-4F45-9708-019B960494DF}">
+            <a:ext uri="{91240B29-F687-4f45-9708-019B960494DF}">
               <a14:hiddenLine xmlns:a14="http://schemas.microsoft.com/office/drawing/2010/main" w="9525">
                 <a:solidFill>
                   <a:schemeClr val="tx1"/>
@@ -3032,7 +3023,7 @@
                 <a:tailEnd/>
               </a14:hiddenLine>
             </a:ext>
-            <a:ext uri="{AF507438-7753-43E0-B8FC-AC1667EBCBE1}">
+            <a:ext uri="{AF507438-7753-43e0-B8FC-AC1667EBCBE1}">
               <a14:hiddenEffects xmlns:a14="http://schemas.microsoft.com/office/drawing/2010/main">
                 <a:effectLst>
                   <a:outerShdw dist="35921" dir="2700000" algn="ctr" rotWithShape="0">
@@ -3548,7 +3539,7 @@
         <p:spPr bwMode="auto">
           <a:xfrm>
             <a:off x="1143000" y="1447800"/>
-            <a:ext cx="7162800" cy="1938992"/>
+            <a:ext cx="7162800" cy="1569660"/>
           </a:xfrm>
           <a:prstGeom prst="rect">
             <a:avLst/>
@@ -3591,7 +3582,7 @@
                 </a:effectLst>
                 <a:latin typeface="Verdana" pitchFamily="34" charset="0"/>
               </a:rPr>
-              <a:t>Using Depleted Uranium in a Soaring Temperature Expeditious Reactor (DUSTER)</a:t>
+              <a:t>Depleted Uranium Soaring Temperature Expeditious Reactor (DUSTER)</a:t>
             </a:r>
             <a:endParaRPr lang="en-US" sz="2400" b="1" dirty="0">
               <a:solidFill>
@@ -3938,7 +3929,7 @@
           </a:prstGeom>
           <a:noFill/>
           <a:extLst>
-            <a:ext uri="{909E8E84-426E-40DD-AFC4-6F175D3DCCD1}">
+            <a:ext uri="{909E8E84-426E-40dd-AFC4-6F175D3DCCD1}">
               <a14:hiddenFill xmlns:a14="http://schemas.microsoft.com/office/drawing/2010/main">
                 <a:solidFill>
                   <a:srgbClr val="FFFFFF"/>
@@ -3956,7 +3947,7 @@
   <p:timing>
     <p:tnLst>
       <p:par>
-        <p:cTn id="1" dur="indefinite" restart="never" nodeType="tmRoot"/>
+        <p:cTn xmlns:p14="http://schemas.microsoft.com/office/powerpoint/2010/main" id="1" dur="indefinite" restart="never" nodeType="tmRoot"/>
       </p:par>
     </p:tnLst>
   </p:timing>
@@ -4003,6 +3994,21 @@
           <a:bodyPr/>
           <a:lstStyle/>
           <a:p>
+            <a:r>
+              <a:rPr lang="en-US" dirty="0" smtClean="0"/>
+              <a:t>Depletion Analysis</a:t>
+            </a:r>
+            <a:br>
+              <a:rPr lang="en-US" dirty="0" smtClean="0"/>
+            </a:br>
+            <a:r>
+              <a:rPr lang="en-US" dirty="0" smtClean="0"/>
+              <a:t>What has been accomplished </a:t>
+            </a:r>
+            <a:r>
+              <a:rPr lang="en-US" smtClean="0"/>
+              <a:t>so far?</a:t>
+            </a:r>
             <a:endParaRPr lang="en-US" dirty="0"/>
           </a:p>
         </p:txBody>
@@ -4021,6 +4027,45 @@
         <p:txBody>
           <a:bodyPr/>
           <a:lstStyle/>
+          <a:p>
+            <a:r>
+              <a:rPr lang="en-US" dirty="0" smtClean="0"/>
+              <a:t>Validation of the burn card implemented in MCNP</a:t>
+            </a:r>
+          </a:p>
+          <a:p>
+            <a:r>
+              <a:rPr lang="en-US" dirty="0" smtClean="0"/>
+              <a:t>Initial burn on a single pin of depleted uranium Reflecting boundaries</a:t>
+            </a:r>
+          </a:p>
+          <a:p>
+            <a:pPr lvl="1"/>
+            <a:r>
+              <a:rPr lang="en-US" dirty="0" smtClean="0"/>
+              <a:t>Assuming uniform power distribution</a:t>
+            </a:r>
+          </a:p>
+          <a:p>
+            <a:r>
+              <a:rPr lang="en-US" dirty="0" smtClean="0"/>
+              <a:t>Initial burn on a single pin of LEU</a:t>
+            </a:r>
+          </a:p>
+          <a:p>
+            <a:pPr lvl="1"/>
+            <a:r>
+              <a:rPr lang="en-US" dirty="0"/>
+              <a:t>Reflecting boundaries</a:t>
+            </a:r>
+          </a:p>
+          <a:p>
+            <a:pPr lvl="1"/>
+            <a:r>
+              <a:rPr lang="en-US" dirty="0"/>
+              <a:t>Assuming uniform power distribution</a:t>
+            </a:r>
+          </a:p>
           <a:p>
             <a:endParaRPr lang="en-US" dirty="0"/>
           </a:p>
@@ -4058,7 +4103,7 @@
   <p:timing>
     <p:tnLst>
       <p:par>
-        <p:cTn id="1" dur="indefinite" restart="never" nodeType="tmRoot"/>
+        <p:cTn xmlns:p14="http://schemas.microsoft.com/office/powerpoint/2010/main" id="1" dur="indefinite" restart="never" nodeType="tmRoot"/>
       </p:par>
     </p:tnLst>
   </p:timing>
@@ -4082,6 +4127,34 @@
           <a:chExt cx="0" cy="0"/>
         </a:xfrm>
       </p:grpSpPr>
+      <p:pic>
+        <p:nvPicPr>
+          <p:cNvPr id="2" name="Content Placeholder 1" descr="Screenshot 2015-10-22 10.52.19.png"/>
+          <p:cNvPicPr>
+            <a:picLocks noGrp="1" noChangeAspect="1"/>
+          </p:cNvPicPr>
+          <p:nvPr>
+            <p:ph sz="half" idx="2"/>
+          </p:nvPr>
+        </p:nvPicPr>
+        <p:blipFill rotWithShape="1">
+          <a:blip r:embed="rId3">
+            <a:extLst>
+              <a:ext uri="{28A0092B-C50C-407E-A947-70E740481C1C}">
+                <a14:useLocalDpi xmlns:a14="http://schemas.microsoft.com/office/drawing/2010/main" val="0"/>
+              </a:ext>
+            </a:extLst>
+          </a:blip>
+          <a:srcRect t="-1888" b="3129"/>
+          <a:stretch/>
+        </p:blipFill>
+        <p:spPr>
+          <a:xfrm>
+            <a:off x="4757092" y="1600201"/>
+            <a:ext cx="3929707" cy="4191000"/>
+          </a:xfrm>
+        </p:spPr>
+      </p:pic>
       <p:sp>
         <p:nvSpPr>
           <p:cNvPr id="157697" name="Title 1"/>
@@ -4097,48 +4170,43 @@
           <a:bodyPr/>
           <a:lstStyle/>
           <a:p>
-            <a:endParaRPr lang="en-US" dirty="0" smtClean="0"/>
-          </a:p>
-        </p:txBody>
-      </p:sp>
-      <p:sp>
-        <p:nvSpPr>
-          <p:cNvPr id="9" name="Content Placeholder 8"/>
-          <p:cNvSpPr>
-            <a:spLocks noGrp="1"/>
-          </p:cNvSpPr>
+            <a:r>
+              <a:rPr lang="en-US" dirty="0" smtClean="0"/>
+              <a:t>Initial Validation Test</a:t>
+            </a:r>
+          </a:p>
+        </p:txBody>
+      </p:sp>
+      <p:pic>
+        <p:nvPicPr>
+          <p:cNvPr id="3" name="Content Placeholder 2" descr="Screenshot 2015-10-22 10.52.01.png"/>
+          <p:cNvPicPr>
+            <a:picLocks noGrp="1" noChangeAspect="1"/>
+          </p:cNvPicPr>
           <p:nvPr>
             <p:ph sz="half" idx="1"/>
           </p:nvPr>
-        </p:nvSpPr>
-        <p:spPr/>
-        <p:txBody>
-          <a:bodyPr/>
-          <a:lstStyle/>
-          <a:p>
-            <a:endParaRPr lang="en-US"/>
-          </a:p>
-        </p:txBody>
-      </p:sp>
-      <p:sp>
-        <p:nvSpPr>
-          <p:cNvPr id="10" name="Content Placeholder 9"/>
-          <p:cNvSpPr>
-            <a:spLocks noGrp="1"/>
-          </p:cNvSpPr>
-          <p:nvPr>
-            <p:ph sz="half" idx="2"/>
-          </p:nvPr>
-        </p:nvSpPr>
-        <p:spPr/>
-        <p:txBody>
-          <a:bodyPr/>
-          <a:lstStyle/>
-          <a:p>
-            <a:endParaRPr lang="en-US" dirty="0"/>
-          </a:p>
-        </p:txBody>
-      </p:sp>
+        </p:nvPicPr>
+        <p:blipFill>
+          <a:blip r:embed="rId4">
+            <a:extLst>
+              <a:ext uri="{28A0092B-C50C-407E-A947-70E740481C1C}">
+                <a14:useLocalDpi xmlns:a14="http://schemas.microsoft.com/office/drawing/2010/main" val="0"/>
+              </a:ext>
+            </a:extLst>
+          </a:blip>
+          <a:srcRect t="-2959" b="-2959"/>
+          <a:stretch>
+            <a:fillRect/>
+          </a:stretch>
+        </p:blipFill>
+        <p:spPr>
+          <a:xfrm>
+            <a:off x="620106" y="1676400"/>
+            <a:ext cx="3875694" cy="4343399"/>
+          </a:xfrm>
+        </p:spPr>
+      </p:pic>
       <p:sp>
         <p:nvSpPr>
           <p:cNvPr id="157699" name="Slide Number Placeholder 3"/>
@@ -4171,10 +4239,707 @@
   <p:timing>
     <p:tnLst>
       <p:par>
-        <p:cTn id="1" dur="indefinite" restart="never" nodeType="tmRoot"/>
+        <p:cTn xmlns:p14="http://schemas.microsoft.com/office/powerpoint/2010/main" id="1" dur="indefinite" restart="never" nodeType="tmRoot"/>
       </p:par>
     </p:tnLst>
   </p:timing>
+</p:sld>
+</file>
+
+<file path=ppt/slides/slide4.xml><?xml version="1.0" encoding="utf-8"?>
+<p:sld xmlns:a="http://schemas.openxmlformats.org/drawingml/2006/main" xmlns:r="http://schemas.openxmlformats.org/officeDocument/2006/relationships" xmlns:p="http://schemas.openxmlformats.org/presentationml/2006/main">
+  <p:cSld>
+    <p:spTree>
+      <p:nvGrpSpPr>
+        <p:cNvPr id="1" name=""/>
+        <p:cNvGrpSpPr/>
+        <p:nvPr/>
+      </p:nvGrpSpPr>
+      <p:grpSpPr>
+        <a:xfrm>
+          <a:off x="0" y="0"/>
+          <a:ext cx="0" cy="0"/>
+          <a:chOff x="0" y="0"/>
+          <a:chExt cx="0" cy="0"/>
+        </a:xfrm>
+      </p:grpSpPr>
+      <p:sp>
+        <p:nvSpPr>
+          <p:cNvPr id="6" name="Title 5"/>
+          <p:cNvSpPr>
+            <a:spLocks noGrp="1"/>
+          </p:cNvSpPr>
+          <p:nvPr>
+            <p:ph type="title"/>
+          </p:nvPr>
+        </p:nvSpPr>
+        <p:spPr/>
+        <p:txBody>
+          <a:bodyPr/>
+          <a:lstStyle/>
+          <a:p>
+            <a:r>
+              <a:rPr lang="en-US" dirty="0" smtClean="0"/>
+              <a:t>Validation Test Results</a:t>
+            </a:r>
+            <a:endParaRPr lang="en-US" dirty="0"/>
+          </a:p>
+        </p:txBody>
+      </p:sp>
+      <p:pic>
+        <p:nvPicPr>
+          <p:cNvPr id="2" name="Content Placeholder 1" descr="Screenshot 2015-10-22 15.30.21.png"/>
+          <p:cNvPicPr>
+            <a:picLocks noGrp="1" noChangeAspect="1"/>
+          </p:cNvPicPr>
+          <p:nvPr>
+            <p:ph idx="1"/>
+          </p:nvPr>
+        </p:nvPicPr>
+        <p:blipFill>
+          <a:blip r:embed="rId2">
+            <a:extLst>
+              <a:ext uri="{28A0092B-C50C-407E-A947-70E740481C1C}">
+                <a14:useLocalDpi xmlns:a14="http://schemas.microsoft.com/office/drawing/2010/main" val="0"/>
+              </a:ext>
+            </a:extLst>
+          </a:blip>
+          <a:srcRect l="-33544" r="-33544"/>
+          <a:stretch>
+            <a:fillRect/>
+          </a:stretch>
+        </p:blipFill>
+        <p:spPr/>
+      </p:pic>
+      <p:sp>
+        <p:nvSpPr>
+          <p:cNvPr id="5" name="Slide Number Placeholder 4"/>
+          <p:cNvSpPr>
+            <a:spLocks noGrp="1"/>
+          </p:cNvSpPr>
+          <p:nvPr>
+            <p:ph type="sldNum" sz="quarter" idx="10"/>
+          </p:nvPr>
+        </p:nvSpPr>
+        <p:spPr/>
+        <p:txBody>
+          <a:bodyPr/>
+          <a:lstStyle/>
+          <a:p>
+            <a:pPr>
+              <a:defRPr/>
+            </a:pPr>
+            <a:fld id="{56039845-206E-4D43-9E5F-DD43C0647861}" type="slidenum">
+              <a:rPr lang="en-US" smtClean="0"/>
+              <a:pPr>
+                <a:defRPr/>
+              </a:pPr>
+              <a:t>4</a:t>
+            </a:fld>
+            <a:endParaRPr lang="en-US" dirty="0"/>
+          </a:p>
+        </p:txBody>
+      </p:sp>
+    </p:spTree>
+    <p:extLst>
+      <p:ext uri="{BB962C8B-B14F-4D97-AF65-F5344CB8AC3E}">
+        <p14:creationId xmlns:p14="http://schemas.microsoft.com/office/powerpoint/2010/main" val="48632203"/>
+      </p:ext>
+    </p:extLst>
+  </p:cSld>
+  <p:clrMapOvr>
+    <a:masterClrMapping/>
+  </p:clrMapOvr>
+</p:sld>
+</file>
+
+<file path=ppt/slides/slide5.xml><?xml version="1.0" encoding="utf-8"?>
+<p:sld xmlns:a="http://schemas.openxmlformats.org/drawingml/2006/main" xmlns:r="http://schemas.openxmlformats.org/officeDocument/2006/relationships" xmlns:p="http://schemas.openxmlformats.org/presentationml/2006/main">
+  <p:cSld>
+    <p:spTree>
+      <p:nvGrpSpPr>
+        <p:cNvPr id="1" name=""/>
+        <p:cNvGrpSpPr/>
+        <p:nvPr/>
+      </p:nvGrpSpPr>
+      <p:grpSpPr>
+        <a:xfrm>
+          <a:off x="0" y="0"/>
+          <a:ext cx="0" cy="0"/>
+          <a:chOff x="0" y="0"/>
+          <a:chExt cx="0" cy="0"/>
+        </a:xfrm>
+      </p:grpSpPr>
+      <p:sp>
+        <p:nvSpPr>
+          <p:cNvPr id="8" name="Title 7"/>
+          <p:cNvSpPr>
+            <a:spLocks noGrp="1"/>
+          </p:cNvSpPr>
+          <p:nvPr>
+            <p:ph type="title"/>
+          </p:nvPr>
+        </p:nvSpPr>
+        <p:spPr/>
+        <p:txBody>
+          <a:bodyPr/>
+          <a:lstStyle/>
+          <a:p>
+            <a:r>
+              <a:rPr lang="en-US" dirty="0" smtClean="0"/>
+              <a:t>Burn of the Depleted and LEU Fuel</a:t>
+            </a:r>
+            <a:endParaRPr lang="en-US" dirty="0"/>
+          </a:p>
+        </p:txBody>
+      </p:sp>
+      <p:sp>
+        <p:nvSpPr>
+          <p:cNvPr id="9" name="Content Placeholder 8"/>
+          <p:cNvSpPr>
+            <a:spLocks noGrp="1"/>
+          </p:cNvSpPr>
+          <p:nvPr>
+            <p:ph sz="half" idx="1"/>
+          </p:nvPr>
+        </p:nvSpPr>
+        <p:spPr>
+          <a:xfrm>
+            <a:off x="457200" y="1600200"/>
+            <a:ext cx="4038600" cy="4571999"/>
+          </a:xfrm>
+        </p:spPr>
+        <p:txBody>
+          <a:bodyPr>
+            <a:normAutofit fontScale="92500" lnSpcReduction="20000"/>
+          </a:bodyPr>
+          <a:lstStyle/>
+          <a:p>
+            <a:r>
+              <a:rPr lang="en-US" dirty="0"/>
+              <a:t>Burned for 30 years</a:t>
+            </a:r>
+          </a:p>
+          <a:p>
+            <a:r>
+              <a:rPr lang="en-US" dirty="0"/>
+              <a:t>This initial run is assuming a constant power profile</a:t>
+            </a:r>
+          </a:p>
+          <a:p>
+            <a:r>
+              <a:rPr lang="en-US" dirty="0"/>
+              <a:t>In fact the power profile will not be constant throughout the core lifetime</a:t>
+            </a:r>
+          </a:p>
+          <a:p>
+            <a:pPr lvl="1"/>
+            <a:r>
+              <a:rPr lang="en-US" dirty="0"/>
+              <a:t>Initially the power fraction in the depleted uranium will be small</a:t>
+            </a:r>
+          </a:p>
+          <a:p>
+            <a:pPr lvl="1"/>
+            <a:r>
+              <a:rPr lang="en-US" dirty="0"/>
+              <a:t>This will increase as the U-238 is converted to Pu-239</a:t>
+            </a:r>
+          </a:p>
+          <a:p>
+            <a:pPr marL="0" indent="0">
+              <a:buNone/>
+            </a:pPr>
+            <a:endParaRPr lang="en-US" dirty="0" smtClean="0"/>
+          </a:p>
+        </p:txBody>
+      </p:sp>
+      <p:pic>
+        <p:nvPicPr>
+          <p:cNvPr id="11" name="Content Placeholder 10" descr="Screenshot 2015-10-22 11.05.44.png"/>
+          <p:cNvPicPr>
+            <a:picLocks noGrp="1" noChangeAspect="1"/>
+          </p:cNvPicPr>
+          <p:nvPr>
+            <p:ph sz="half" idx="2"/>
+          </p:nvPr>
+        </p:nvPicPr>
+        <p:blipFill>
+          <a:blip r:embed="rId2">
+            <a:extLst>
+              <a:ext uri="{28A0092B-C50C-407E-A947-70E740481C1C}">
+                <a14:useLocalDpi xmlns:a14="http://schemas.microsoft.com/office/drawing/2010/main" val="0"/>
+              </a:ext>
+            </a:extLst>
+          </a:blip>
+          <a:srcRect t="-6574" b="-6574"/>
+          <a:stretch>
+            <a:fillRect/>
+          </a:stretch>
+        </p:blipFill>
+        <p:spPr>
+          <a:xfrm>
+            <a:off x="4648200" y="1600201"/>
+            <a:ext cx="3886200" cy="4355172"/>
+          </a:xfrm>
+        </p:spPr>
+      </p:pic>
+      <p:sp>
+        <p:nvSpPr>
+          <p:cNvPr id="4" name="Slide Number Placeholder 3"/>
+          <p:cNvSpPr>
+            <a:spLocks noGrp="1"/>
+          </p:cNvSpPr>
+          <p:nvPr>
+            <p:ph type="sldNum" sz="quarter" idx="12"/>
+          </p:nvPr>
+        </p:nvSpPr>
+        <p:spPr/>
+        <p:txBody>
+          <a:bodyPr/>
+          <a:lstStyle/>
+          <a:p>
+            <a:pPr>
+              <a:defRPr/>
+            </a:pPr>
+            <a:fld id="{639E97B8-4532-408E-A5F7-ACF05B64D361}" type="slidenum">
+              <a:rPr lang="en-US" smtClean="0"/>
+              <a:pPr>
+                <a:defRPr/>
+              </a:pPr>
+              <a:t>5</a:t>
+            </a:fld>
+            <a:endParaRPr lang="en-US" dirty="0"/>
+          </a:p>
+        </p:txBody>
+      </p:sp>
+    </p:spTree>
+    <p:extLst>
+      <p:ext uri="{BB962C8B-B14F-4D97-AF65-F5344CB8AC3E}">
+        <p14:creationId xmlns:p14="http://schemas.microsoft.com/office/powerpoint/2010/main" val="146621590"/>
+      </p:ext>
+    </p:extLst>
+  </p:cSld>
+  <p:clrMapOvr>
+    <a:masterClrMapping/>
+  </p:clrMapOvr>
+</p:sld>
+</file>
+
+<file path=ppt/slides/slide6.xml><?xml version="1.0" encoding="utf-8"?>
+<p:sld xmlns:a="http://schemas.openxmlformats.org/drawingml/2006/main" xmlns:r="http://schemas.openxmlformats.org/officeDocument/2006/relationships" xmlns:p="http://schemas.openxmlformats.org/presentationml/2006/main">
+  <p:cSld>
+    <p:spTree>
+      <p:nvGrpSpPr>
+        <p:cNvPr id="1" name=""/>
+        <p:cNvGrpSpPr/>
+        <p:nvPr/>
+      </p:nvGrpSpPr>
+      <p:grpSpPr>
+        <a:xfrm>
+          <a:off x="0" y="0"/>
+          <a:ext cx="0" cy="0"/>
+          <a:chOff x="0" y="0"/>
+          <a:chExt cx="0" cy="0"/>
+        </a:xfrm>
+      </p:grpSpPr>
+      <p:sp>
+        <p:nvSpPr>
+          <p:cNvPr id="2" name="Title 1"/>
+          <p:cNvSpPr>
+            <a:spLocks noGrp="1"/>
+          </p:cNvSpPr>
+          <p:nvPr>
+            <p:ph type="title"/>
+          </p:nvPr>
+        </p:nvSpPr>
+        <p:spPr/>
+        <p:txBody>
+          <a:bodyPr/>
+          <a:lstStyle/>
+          <a:p>
+            <a:r>
+              <a:rPr lang="en-US" dirty="0" smtClean="0"/>
+              <a:t>Burn of the </a:t>
+            </a:r>
+            <a:r>
+              <a:rPr lang="en-US" dirty="0"/>
+              <a:t>D</a:t>
+            </a:r>
+            <a:r>
+              <a:rPr lang="en-US" dirty="0" smtClean="0"/>
+              <a:t>epleted </a:t>
+            </a:r>
+            <a:r>
+              <a:rPr lang="en-US" dirty="0"/>
+              <a:t>U</a:t>
+            </a:r>
+            <a:r>
+              <a:rPr lang="en-US" dirty="0" smtClean="0"/>
+              <a:t>ranium</a:t>
+            </a:r>
+            <a:endParaRPr lang="en-US" dirty="0"/>
+          </a:p>
+        </p:txBody>
+      </p:sp>
+      <p:pic>
+        <p:nvPicPr>
+          <p:cNvPr id="9" name="Content Placeholder 8" descr="Pu-239.png"/>
+          <p:cNvPicPr>
+            <a:picLocks noGrp="1" noChangeAspect="1"/>
+          </p:cNvPicPr>
+          <p:nvPr>
+            <p:ph sz="half" idx="2"/>
+          </p:nvPr>
+        </p:nvPicPr>
+        <p:blipFill>
+          <a:blip r:embed="rId2">
+            <a:extLst>
+              <a:ext uri="{28A0092B-C50C-407E-A947-70E740481C1C}">
+                <a14:useLocalDpi xmlns:a14="http://schemas.microsoft.com/office/drawing/2010/main" val="0"/>
+              </a:ext>
+            </a:extLst>
+          </a:blip>
+          <a:srcRect t="-32631" b="-32631"/>
+          <a:stretch>
+            <a:fillRect/>
+          </a:stretch>
+        </p:blipFill>
+        <p:spPr/>
+      </p:pic>
+      <p:sp>
+        <p:nvSpPr>
+          <p:cNvPr id="5" name="Slide Number Placeholder 4"/>
+          <p:cNvSpPr>
+            <a:spLocks noGrp="1"/>
+          </p:cNvSpPr>
+          <p:nvPr>
+            <p:ph type="sldNum" sz="quarter" idx="12"/>
+          </p:nvPr>
+        </p:nvSpPr>
+        <p:spPr/>
+        <p:txBody>
+          <a:bodyPr/>
+          <a:lstStyle/>
+          <a:p>
+            <a:pPr>
+              <a:defRPr/>
+            </a:pPr>
+            <a:fld id="{56039845-206E-4D43-9E5F-DD43C0647861}" type="slidenum">
+              <a:rPr lang="en-US" smtClean="0"/>
+              <a:pPr>
+                <a:defRPr/>
+              </a:pPr>
+              <a:t>6</a:t>
+            </a:fld>
+            <a:endParaRPr lang="en-US" dirty="0"/>
+          </a:p>
+        </p:txBody>
+      </p:sp>
+      <p:pic>
+        <p:nvPicPr>
+          <p:cNvPr id="11" name="Content Placeholder 10" descr="U-238.png"/>
+          <p:cNvPicPr>
+            <a:picLocks noGrp="1" noChangeAspect="1"/>
+          </p:cNvPicPr>
+          <p:nvPr>
+            <p:ph sz="half" idx="1"/>
+          </p:nvPr>
+        </p:nvPicPr>
+        <p:blipFill>
+          <a:blip r:embed="rId3">
+            <a:extLst>
+              <a:ext uri="{28A0092B-C50C-407E-A947-70E740481C1C}">
+                <a14:useLocalDpi xmlns:a14="http://schemas.microsoft.com/office/drawing/2010/main" val="0"/>
+              </a:ext>
+            </a:extLst>
+          </a:blip>
+          <a:srcRect t="-32427" b="-32427"/>
+          <a:stretch>
+            <a:fillRect/>
+          </a:stretch>
+        </p:blipFill>
+        <p:spPr/>
+      </p:pic>
+    </p:spTree>
+    <p:extLst>
+      <p:ext uri="{BB962C8B-B14F-4D97-AF65-F5344CB8AC3E}">
+        <p14:creationId xmlns:p14="http://schemas.microsoft.com/office/powerpoint/2010/main" val="105699533"/>
+      </p:ext>
+    </p:extLst>
+  </p:cSld>
+  <p:clrMapOvr>
+    <a:masterClrMapping/>
+  </p:clrMapOvr>
+</p:sld>
+</file>
+
+<file path=ppt/slides/slide7.xml><?xml version="1.0" encoding="utf-8"?>
+<p:sld xmlns:a="http://schemas.openxmlformats.org/drawingml/2006/main" xmlns:r="http://schemas.openxmlformats.org/officeDocument/2006/relationships" xmlns:p="http://schemas.openxmlformats.org/presentationml/2006/main">
+  <p:cSld>
+    <p:spTree>
+      <p:nvGrpSpPr>
+        <p:cNvPr id="1" name=""/>
+        <p:cNvGrpSpPr/>
+        <p:nvPr/>
+      </p:nvGrpSpPr>
+      <p:grpSpPr>
+        <a:xfrm>
+          <a:off x="0" y="0"/>
+          <a:ext cx="0" cy="0"/>
+          <a:chOff x="0" y="0"/>
+          <a:chExt cx="0" cy="0"/>
+        </a:xfrm>
+      </p:grpSpPr>
+      <p:sp>
+        <p:nvSpPr>
+          <p:cNvPr id="2" name="Title 1"/>
+          <p:cNvSpPr>
+            <a:spLocks noGrp="1"/>
+          </p:cNvSpPr>
+          <p:nvPr>
+            <p:ph type="title"/>
+          </p:nvPr>
+        </p:nvSpPr>
+        <p:spPr/>
+        <p:txBody>
+          <a:bodyPr/>
+          <a:lstStyle/>
+          <a:p>
+            <a:r>
+              <a:rPr lang="en-US" dirty="0" smtClean="0"/>
+              <a:t>Burn of the LEU</a:t>
+            </a:r>
+            <a:endParaRPr lang="en-US" dirty="0"/>
+          </a:p>
+        </p:txBody>
+      </p:sp>
+      <p:pic>
+        <p:nvPicPr>
+          <p:cNvPr id="7" name="Content Placeholder 6" descr="u-235.png"/>
+          <p:cNvPicPr>
+            <a:picLocks noGrp="1" noChangeAspect="1"/>
+          </p:cNvPicPr>
+          <p:nvPr>
+            <p:ph sz="half" idx="1"/>
+          </p:nvPr>
+        </p:nvPicPr>
+        <p:blipFill>
+          <a:blip r:embed="rId2">
+            <a:extLst>
+              <a:ext uri="{28A0092B-C50C-407E-A947-70E740481C1C}">
+                <a14:useLocalDpi xmlns:a14="http://schemas.microsoft.com/office/drawing/2010/main" val="0"/>
+              </a:ext>
+            </a:extLst>
+          </a:blip>
+          <a:srcRect t="-32358" b="-32358"/>
+          <a:stretch>
+            <a:fillRect/>
+          </a:stretch>
+        </p:blipFill>
+        <p:spPr/>
+      </p:pic>
+      <p:pic>
+        <p:nvPicPr>
+          <p:cNvPr id="6" name="Content Placeholder 5" descr="Pu-239.png"/>
+          <p:cNvPicPr>
+            <a:picLocks noGrp="1" noChangeAspect="1"/>
+          </p:cNvPicPr>
+          <p:nvPr>
+            <p:ph sz="half" idx="2"/>
+          </p:nvPr>
+        </p:nvPicPr>
+        <p:blipFill>
+          <a:blip r:embed="rId3">
+            <a:extLst>
+              <a:ext uri="{28A0092B-C50C-407E-A947-70E740481C1C}">
+                <a14:useLocalDpi xmlns:a14="http://schemas.microsoft.com/office/drawing/2010/main" val="0"/>
+              </a:ext>
+            </a:extLst>
+          </a:blip>
+          <a:srcRect t="-32562" b="-32562"/>
+          <a:stretch>
+            <a:fillRect/>
+          </a:stretch>
+        </p:blipFill>
+        <p:spPr/>
+      </p:pic>
+      <p:sp>
+        <p:nvSpPr>
+          <p:cNvPr id="5" name="Slide Number Placeholder 4"/>
+          <p:cNvSpPr>
+            <a:spLocks noGrp="1"/>
+          </p:cNvSpPr>
+          <p:nvPr>
+            <p:ph type="sldNum" sz="quarter" idx="12"/>
+          </p:nvPr>
+        </p:nvSpPr>
+        <p:spPr/>
+        <p:txBody>
+          <a:bodyPr/>
+          <a:lstStyle/>
+          <a:p>
+            <a:pPr>
+              <a:defRPr/>
+            </a:pPr>
+            <a:fld id="{56039845-206E-4D43-9E5F-DD43C0647861}" type="slidenum">
+              <a:rPr lang="en-US" smtClean="0"/>
+              <a:pPr>
+                <a:defRPr/>
+              </a:pPr>
+              <a:t>7</a:t>
+            </a:fld>
+            <a:endParaRPr lang="en-US" dirty="0"/>
+          </a:p>
+        </p:txBody>
+      </p:sp>
+    </p:spTree>
+    <p:extLst>
+      <p:ext uri="{BB962C8B-B14F-4D97-AF65-F5344CB8AC3E}">
+        <p14:creationId xmlns:p14="http://schemas.microsoft.com/office/powerpoint/2010/main" val="3644947947"/>
+      </p:ext>
+    </p:extLst>
+  </p:cSld>
+  <p:clrMapOvr>
+    <a:masterClrMapping/>
+  </p:clrMapOvr>
+</p:sld>
+</file>
+
+<file path=ppt/slides/slide8.xml><?xml version="1.0" encoding="utf-8"?>
+<p:sld xmlns:a="http://schemas.openxmlformats.org/drawingml/2006/main" xmlns:r="http://schemas.openxmlformats.org/officeDocument/2006/relationships" xmlns:p="http://schemas.openxmlformats.org/presentationml/2006/main">
+  <p:cSld>
+    <p:spTree>
+      <p:nvGrpSpPr>
+        <p:cNvPr id="1" name=""/>
+        <p:cNvGrpSpPr/>
+        <p:nvPr/>
+      </p:nvGrpSpPr>
+      <p:grpSpPr>
+        <a:xfrm>
+          <a:off x="0" y="0"/>
+          <a:ext cx="0" cy="0"/>
+          <a:chOff x="0" y="0"/>
+          <a:chExt cx="0" cy="0"/>
+        </a:xfrm>
+      </p:grpSpPr>
+      <p:sp>
+        <p:nvSpPr>
+          <p:cNvPr id="2" name="Title 1"/>
+          <p:cNvSpPr>
+            <a:spLocks noGrp="1"/>
+          </p:cNvSpPr>
+          <p:nvPr>
+            <p:ph type="title"/>
+          </p:nvPr>
+        </p:nvSpPr>
+        <p:spPr/>
+        <p:txBody>
+          <a:bodyPr/>
+          <a:lstStyle/>
+          <a:p>
+            <a:r>
+              <a:rPr lang="en-US" dirty="0" smtClean="0"/>
+              <a:t>What’s next?</a:t>
+            </a:r>
+            <a:endParaRPr lang="en-US" dirty="0"/>
+          </a:p>
+        </p:txBody>
+      </p:sp>
+      <p:sp>
+        <p:nvSpPr>
+          <p:cNvPr id="6" name="Content Placeholder 5"/>
+          <p:cNvSpPr>
+            <a:spLocks noGrp="1"/>
+          </p:cNvSpPr>
+          <p:nvPr>
+            <p:ph idx="1"/>
+          </p:nvPr>
+        </p:nvSpPr>
+        <p:spPr/>
+        <p:txBody>
+          <a:bodyPr>
+            <a:normAutofit fontScale="92500" lnSpcReduction="10000"/>
+          </a:bodyPr>
+          <a:lstStyle/>
+          <a:p>
+            <a:r>
+              <a:rPr lang="en-US" dirty="0" smtClean="0"/>
+              <a:t>Hopefully burn the entire core to determine an estimate of the core lifetime	</a:t>
+            </a:r>
+          </a:p>
+          <a:p>
+            <a:pPr lvl="1"/>
+            <a:r>
+              <a:rPr lang="en-US" dirty="0" smtClean="0"/>
+              <a:t>This will be decided through the multiplication factor, not the integrity of the </a:t>
+            </a:r>
+            <a:r>
+              <a:rPr lang="en-US" dirty="0" smtClean="0"/>
+              <a:t>materials</a:t>
+            </a:r>
+          </a:p>
+          <a:p>
+            <a:r>
+              <a:rPr lang="en-US" dirty="0" smtClean="0"/>
+              <a:t>Run depletion calculations using different power fractions to determine spatial differences in the fuel compositions</a:t>
+            </a:r>
+          </a:p>
+          <a:p>
+            <a:r>
+              <a:rPr lang="en-US" dirty="0" smtClean="0"/>
+              <a:t>Analyze EOL fuel compositions</a:t>
+            </a:r>
+          </a:p>
+          <a:p>
+            <a:pPr lvl="1"/>
+            <a:r>
+              <a:rPr lang="en-US" dirty="0" smtClean="0"/>
+              <a:t>Core lifetime may be uncertain so a sensitivity analysis may be needed</a:t>
+            </a:r>
+            <a:endParaRPr lang="en-US" dirty="0"/>
+          </a:p>
+        </p:txBody>
+      </p:sp>
+      <p:sp>
+        <p:nvSpPr>
+          <p:cNvPr id="5" name="Slide Number Placeholder 4"/>
+          <p:cNvSpPr>
+            <a:spLocks noGrp="1"/>
+          </p:cNvSpPr>
+          <p:nvPr>
+            <p:ph type="sldNum" sz="quarter" idx="10"/>
+          </p:nvPr>
+        </p:nvSpPr>
+        <p:spPr/>
+        <p:txBody>
+          <a:bodyPr/>
+          <a:lstStyle/>
+          <a:p>
+            <a:pPr>
+              <a:defRPr/>
+            </a:pPr>
+            <a:fld id="{56039845-206E-4D43-9E5F-DD43C0647861}" type="slidenum">
+              <a:rPr lang="en-US" smtClean="0"/>
+              <a:pPr>
+                <a:defRPr/>
+              </a:pPr>
+              <a:t>8</a:t>
+            </a:fld>
+            <a:endParaRPr lang="en-US" dirty="0"/>
+          </a:p>
+        </p:txBody>
+      </p:sp>
+    </p:spTree>
+    <p:extLst>
+      <p:ext uri="{BB962C8B-B14F-4D97-AF65-F5344CB8AC3E}">
+        <p14:creationId xmlns:p14="http://schemas.microsoft.com/office/powerpoint/2010/main" val="2776806330"/>
+      </p:ext>
+    </p:extLst>
+  </p:cSld>
+  <p:clrMapOvr>
+    <a:masterClrMapping/>
+  </p:clrMapOvr>
 </p:sld>
 </file>
 

</xml_diff>

<commit_message>
added spreadsheet to look at for econ model, also added my portion of the slides.
</commit_message>
<xml_diff>
--- a/presentations/mid_PP/mid.pptx
+++ b/presentations/mid_PP/mid.pptx
@@ -5,10 +5,10 @@
     <p:sldMasterId id="2147483649" r:id="rId1"/>
   </p:sldMasterIdLst>
   <p:notesMasterIdLst>
-    <p:notesMasterId r:id="rId25"/>
+    <p:notesMasterId r:id="rId27"/>
   </p:notesMasterIdLst>
   <p:handoutMasterIdLst>
-    <p:handoutMasterId r:id="rId26"/>
+    <p:handoutMasterId r:id="rId28"/>
   </p:handoutMasterIdLst>
   <p:sldIdLst>
     <p:sldId id="576" r:id="rId2"/>
@@ -34,32 +34,34 @@
     <p:sldId id="595" r:id="rId22"/>
     <p:sldId id="596" r:id="rId23"/>
     <p:sldId id="597" r:id="rId24"/>
+    <p:sldId id="598" r:id="rId25"/>
+    <p:sldId id="599" r:id="rId26"/>
   </p:sldIdLst>
   <p:sldSz cx="9144000" cy="6858000" type="screen4x3"/>
   <p:notesSz cx="6950075" cy="9236075"/>
   <p:embeddedFontLst>
     <p:embeddedFont>
       <p:font typeface="Calibri" panose="020F0502020204030204" pitchFamily="34" charset="0"/>
-      <p:regular r:id="rId27"/>
-      <p:bold r:id="rId28"/>
-      <p:italic r:id="rId29"/>
-      <p:boldItalic r:id="rId30"/>
+      <p:regular r:id="rId29"/>
+      <p:bold r:id="rId30"/>
+      <p:italic r:id="rId31"/>
+      <p:boldItalic r:id="rId32"/>
     </p:embeddedFont>
     <p:embeddedFont>
       <p:font typeface="Verdana" panose="020B0604030504040204" pitchFamily="34" charset="0"/>
-      <p:regular r:id="rId31"/>
-      <p:bold r:id="rId32"/>
-      <p:italic r:id="rId33"/>
-      <p:boldItalic r:id="rId34"/>
+      <p:regular r:id="rId33"/>
+      <p:bold r:id="rId34"/>
+      <p:italic r:id="rId35"/>
+      <p:boldItalic r:id="rId36"/>
     </p:embeddedFont>
     <p:embeddedFont>
       <p:font typeface="Cambria Math" panose="02040503050406030204" pitchFamily="18" charset="0"/>
-      <p:regular r:id="rId35"/>
+      <p:regular r:id="rId37"/>
     </p:embeddedFont>
     <p:embeddedFont>
       <p:font typeface="Tahoma" panose="020B0604030504040204" pitchFamily="34" charset="0"/>
-      <p:regular r:id="rId36"/>
-      <p:bold r:id="rId37"/>
+      <p:regular r:id="rId38"/>
+      <p:bold r:id="rId39"/>
     </p:embeddedFont>
   </p:embeddedFontLst>
   <p:defaultTextStyle>
@@ -3617,11 +3619,11 @@
           <c:showPercent val="0"/>
           <c:showBubbleSize val="0"/>
         </c:dLbls>
-        <c:axId val="338633904"/>
-        <c:axId val="338631104"/>
+        <c:axId val="205466272"/>
+        <c:axId val="205466832"/>
       </c:scatterChart>
       <c:valAx>
-        <c:axId val="338633904"/>
+        <c:axId val="205466272"/>
         <c:scaling>
           <c:logBase val="10"/>
           <c:orientation val="minMax"/>
@@ -3669,7 +3671,6 @@
               </a:p>
             </c:rich>
           </c:tx>
-          <c:layout/>
           <c:overlay val="0"/>
           <c:spPr>
             <a:noFill/>
@@ -3716,12 +3717,12 @@
             <a:endParaRPr lang="en-US"/>
           </a:p>
         </c:txPr>
-        <c:crossAx val="338631104"/>
+        <c:crossAx val="205466832"/>
         <c:crosses val="autoZero"/>
         <c:crossBetween val="midCat"/>
       </c:valAx>
       <c:valAx>
-        <c:axId val="338631104"/>
+        <c:axId val="205466832"/>
         <c:scaling>
           <c:logBase val="10"/>
           <c:orientation val="minMax"/>
@@ -3771,7 +3772,6 @@
               </a:p>
             </c:rich>
           </c:tx>
-          <c:layout/>
           <c:overlay val="0"/>
           <c:spPr>
             <a:noFill/>
@@ -3818,7 +3818,7 @@
             <a:endParaRPr lang="en-US"/>
           </a:p>
         </c:txPr>
-        <c:crossAx val="338633904"/>
+        <c:crossAx val="205466272"/>
         <c:crosses val="autoZero"/>
         <c:crossBetween val="midCat"/>
       </c:valAx>
@@ -4266,8 +4266,8 @@
           <c:showPercent val="0"/>
           <c:showBubbleSize val="0"/>
         </c:dLbls>
-        <c:axId val="532651296"/>
-        <c:axId val="532651856"/>
+        <c:axId val="200096320"/>
+        <c:axId val="200096880"/>
         <c:extLst xmlns:c16r2="http://schemas.microsoft.com/office/drawing/2015/06/chart">
           <c:ext xmlns:c15="http://schemas.microsoft.com/office/drawing/2012/chart" uri="{02D57815-91ED-43cb-92C2-25804820EDAC}">
             <c15:filteredScatterSeries>
@@ -4373,7 +4373,7 @@
         </c:extLst>
       </c:scatterChart>
       <c:valAx>
-        <c:axId val="532651296"/>
+        <c:axId val="200096320"/>
         <c:scaling>
           <c:orientation val="minMax"/>
         </c:scaling>
@@ -4430,12 +4430,12 @@
             <a:endParaRPr lang="en-US"/>
           </a:p>
         </c:txPr>
-        <c:crossAx val="532651856"/>
+        <c:crossAx val="200096880"/>
         <c:crosses val="autoZero"/>
         <c:crossBetween val="midCat"/>
       </c:valAx>
       <c:valAx>
-        <c:axId val="532651856"/>
+        <c:axId val="200096880"/>
         <c:scaling>
           <c:orientation val="minMax"/>
           <c:min val="0"/>
@@ -4493,7 +4493,7 @@
             <a:endParaRPr lang="en-US"/>
           </a:p>
         </c:txPr>
-        <c:crossAx val="532651296"/>
+        <c:crossAx val="200096320"/>
         <c:crosses val="autoZero"/>
         <c:crossBetween val="midCat"/>
       </c:valAx>
@@ -4763,8 +4763,8 @@
           <c:showPercent val="0"/>
           <c:showBubbleSize val="0"/>
         </c:dLbls>
-        <c:axId val="532764864"/>
-        <c:axId val="532765424"/>
+        <c:axId val="200428208"/>
+        <c:axId val="200428768"/>
         <c:extLst xmlns:c16r2="http://schemas.microsoft.com/office/drawing/2015/06/chart">
           <c:ext xmlns:c15="http://schemas.microsoft.com/office/drawing/2012/chart" uri="{02D57815-91ED-43cb-92C2-25804820EDAC}">
             <c15:filteredScatterSeries>
@@ -4899,7 +4899,7 @@
                 </c:marker>
                 <c:xVal>
                   <c:numRef>
-                    <c:extLst xmlns:c15="http://schemas.microsoft.com/office/drawing/2012/chart" xmlns:c16r2="http://schemas.microsoft.com/office/drawing/2015/06/chart">
+                    <c:extLst xmlns:c16r2="http://schemas.microsoft.com/office/drawing/2015/06/chart" xmlns:c15="http://schemas.microsoft.com/office/drawing/2012/chart">
                       <c:ext xmlns:c15="http://schemas.microsoft.com/office/drawing/2012/chart" uri="{02D57815-91ED-43cb-92C2-25804820EDAC}">
                         <c15:formulaRef>
                           <c15:sqref>'[Analytical temp (3).xlsx]pins'!$W$11:$AA$11</c15:sqref>
@@ -4929,7 +4929,7 @@
                 </c:xVal>
                 <c:yVal>
                   <c:numRef>
-                    <c:extLst xmlns:c15="http://schemas.microsoft.com/office/drawing/2012/chart" xmlns:c16r2="http://schemas.microsoft.com/office/drawing/2015/06/chart">
+                    <c:extLst xmlns:c16r2="http://schemas.microsoft.com/office/drawing/2015/06/chart" xmlns:c15="http://schemas.microsoft.com/office/drawing/2012/chart">
                       <c:ext xmlns:c15="http://schemas.microsoft.com/office/drawing/2012/chart" uri="{02D57815-91ED-43cb-92C2-25804820EDAC}">
                         <c15:formulaRef>
                           <c15:sqref>'[Analytical temp (3).xlsx]pins'!$AF$15:$AJ$15</c15:sqref>
@@ -4958,7 +4958,7 @@
                   </c:numRef>
                 </c:yVal>
                 <c:smooth val="0"/>
-                <c:extLst xmlns:c16r2="http://schemas.microsoft.com/office/drawing/2015/06/chart" xmlns:c15="http://schemas.microsoft.com/office/drawing/2012/chart">
+                <c:extLst xmlns:c15="http://schemas.microsoft.com/office/drawing/2012/chart" xmlns:c16r2="http://schemas.microsoft.com/office/drawing/2015/06/chart">
                   <c:ext xmlns:c16="http://schemas.microsoft.com/office/drawing/2014/chart" uri="{C3380CC4-5D6E-409C-BE32-E72D297353CC}">
                     <c16:uniqueId val="{00000001-55F7-4BAC-9ED7-0A0DBC995522}"/>
                   </c:ext>
@@ -4998,7 +4998,7 @@
                 </c:marker>
                 <c:xVal>
                   <c:numRef>
-                    <c:extLst xmlns:c15="http://schemas.microsoft.com/office/drawing/2012/chart" xmlns:c16r2="http://schemas.microsoft.com/office/drawing/2015/06/chart">
+                    <c:extLst xmlns:c16r2="http://schemas.microsoft.com/office/drawing/2015/06/chart" xmlns:c15="http://schemas.microsoft.com/office/drawing/2012/chart">
                       <c:ext xmlns:c15="http://schemas.microsoft.com/office/drawing/2012/chart" uri="{02D57815-91ED-43cb-92C2-25804820EDAC}">
                         <c15:formulaRef>
                           <c15:sqref>'[Analytical temp (3).xlsx]pins'!$W$11:$AA$11</c15:sqref>
@@ -5028,7 +5028,7 @@
                 </c:xVal>
                 <c:yVal>
                   <c:numRef>
-                    <c:extLst xmlns:c15="http://schemas.microsoft.com/office/drawing/2012/chart" xmlns:c16r2="http://schemas.microsoft.com/office/drawing/2015/06/chart">
+                    <c:extLst xmlns:c16r2="http://schemas.microsoft.com/office/drawing/2015/06/chart" xmlns:c15="http://schemas.microsoft.com/office/drawing/2012/chart">
                       <c:ext xmlns:c15="http://schemas.microsoft.com/office/drawing/2012/chart" uri="{02D57815-91ED-43cb-92C2-25804820EDAC}">
                         <c15:formulaRef>
                           <c15:sqref>'[Analytical temp (3).xlsx]pins'!$AF$16:$AJ$16</c15:sqref>
@@ -5057,7 +5057,7 @@
                   </c:numRef>
                 </c:yVal>
                 <c:smooth val="0"/>
-                <c:extLst xmlns:c16r2="http://schemas.microsoft.com/office/drawing/2015/06/chart" xmlns:c15="http://schemas.microsoft.com/office/drawing/2012/chart">
+                <c:extLst xmlns:c15="http://schemas.microsoft.com/office/drawing/2012/chart" xmlns:c16r2="http://schemas.microsoft.com/office/drawing/2015/06/chart">
                   <c:ext xmlns:c16="http://schemas.microsoft.com/office/drawing/2014/chart" uri="{C3380CC4-5D6E-409C-BE32-E72D297353CC}">
                     <c16:uniqueId val="{00000002-55F7-4BAC-9ED7-0A0DBC995522}"/>
                   </c:ext>
@@ -5097,7 +5097,7 @@
                 </c:marker>
                 <c:xVal>
                   <c:numRef>
-                    <c:extLst xmlns:c15="http://schemas.microsoft.com/office/drawing/2012/chart" xmlns:c16r2="http://schemas.microsoft.com/office/drawing/2015/06/chart">
+                    <c:extLst xmlns:c16r2="http://schemas.microsoft.com/office/drawing/2015/06/chart" xmlns:c15="http://schemas.microsoft.com/office/drawing/2012/chart">
                       <c:ext xmlns:c15="http://schemas.microsoft.com/office/drawing/2012/chart" uri="{02D57815-91ED-43cb-92C2-25804820EDAC}">
                         <c15:formulaRef>
                           <c15:sqref>'[Analytical temp (3).xlsx]pins'!$W$11:$AA$11</c15:sqref>
@@ -5127,7 +5127,7 @@
                 </c:xVal>
                 <c:yVal>
                   <c:numRef>
-                    <c:extLst xmlns:c15="http://schemas.microsoft.com/office/drawing/2012/chart" xmlns:c16r2="http://schemas.microsoft.com/office/drawing/2015/06/chart">
+                    <c:extLst xmlns:c16r2="http://schemas.microsoft.com/office/drawing/2015/06/chart" xmlns:c15="http://schemas.microsoft.com/office/drawing/2012/chart">
                       <c:ext xmlns:c15="http://schemas.microsoft.com/office/drawing/2012/chart" uri="{02D57815-91ED-43cb-92C2-25804820EDAC}">
                         <c15:formulaRef>
                           <c15:sqref>'[Analytical temp (3).xlsx]pins'!$AL$14:$AP$14</c15:sqref>
@@ -5191,7 +5191,7 @@
                 </c:marker>
                 <c:xVal>
                   <c:numRef>
-                    <c:extLst xmlns:c15="http://schemas.microsoft.com/office/drawing/2012/chart" xmlns:c16r2="http://schemas.microsoft.com/office/drawing/2015/06/chart">
+                    <c:extLst xmlns:c16r2="http://schemas.microsoft.com/office/drawing/2015/06/chart" xmlns:c15="http://schemas.microsoft.com/office/drawing/2012/chart">
                       <c:ext xmlns:c15="http://schemas.microsoft.com/office/drawing/2012/chart" uri="{02D57815-91ED-43cb-92C2-25804820EDAC}">
                         <c15:formulaRef>
                           <c15:sqref>'[Analytical temp (3).xlsx]pins'!$W$11:$AA$11</c15:sqref>
@@ -5221,7 +5221,7 @@
                 </c:xVal>
                 <c:yVal>
                   <c:numRef>
-                    <c:extLst xmlns:c15="http://schemas.microsoft.com/office/drawing/2012/chart" xmlns:c16r2="http://schemas.microsoft.com/office/drawing/2015/06/chart">
+                    <c:extLst xmlns:c16r2="http://schemas.microsoft.com/office/drawing/2015/06/chart" xmlns:c15="http://schemas.microsoft.com/office/drawing/2012/chart">
                       <c:ext xmlns:c15="http://schemas.microsoft.com/office/drawing/2012/chart" uri="{02D57815-91ED-43cb-92C2-25804820EDAC}">
                         <c15:formulaRef>
                           <c15:sqref>'[Analytical temp (3).xlsx]pins'!$AL$15:$AP$15</c15:sqref>
@@ -5291,7 +5291,7 @@
                 </c:marker>
                 <c:xVal>
                   <c:numRef>
-                    <c:extLst xmlns:c15="http://schemas.microsoft.com/office/drawing/2012/chart" xmlns:c16r2="http://schemas.microsoft.com/office/drawing/2015/06/chart">
+                    <c:extLst xmlns:c16r2="http://schemas.microsoft.com/office/drawing/2015/06/chart" xmlns:c15="http://schemas.microsoft.com/office/drawing/2012/chart">
                       <c:ext xmlns:c15="http://schemas.microsoft.com/office/drawing/2012/chart" uri="{02D57815-91ED-43cb-92C2-25804820EDAC}">
                         <c15:formulaRef>
                           <c15:sqref>'[Analytical temp (3).xlsx]pins'!$W$11:$AA$11</c15:sqref>
@@ -5321,7 +5321,7 @@
                 </c:xVal>
                 <c:yVal>
                   <c:numRef>
-                    <c:extLst xmlns:c15="http://schemas.microsoft.com/office/drawing/2012/chart" xmlns:c16r2="http://schemas.microsoft.com/office/drawing/2015/06/chart">
+                    <c:extLst xmlns:c16r2="http://schemas.microsoft.com/office/drawing/2015/06/chart" xmlns:c15="http://schemas.microsoft.com/office/drawing/2012/chart">
                       <c:ext xmlns:c15="http://schemas.microsoft.com/office/drawing/2012/chart" uri="{02D57815-91ED-43cb-92C2-25804820EDAC}">
                         <c15:formulaRef>
                           <c15:sqref>'[Analytical temp (3).xlsx]pins'!$AL$16:$AP$16</c15:sqref>
@@ -5356,7 +5356,7 @@
         </c:extLst>
       </c:scatterChart>
       <c:valAx>
-        <c:axId val="532764864"/>
+        <c:axId val="200428208"/>
         <c:scaling>
           <c:orientation val="minMax"/>
         </c:scaling>
@@ -5469,12 +5469,12 @@
             <a:endParaRPr lang="en-US"/>
           </a:p>
         </c:txPr>
-        <c:crossAx val="532765424"/>
+        <c:crossAx val="200428768"/>
         <c:crosses val="autoZero"/>
         <c:crossBetween val="midCat"/>
       </c:valAx>
       <c:valAx>
-        <c:axId val="532765424"/>
+        <c:axId val="200428768"/>
         <c:scaling>
           <c:orientation val="minMax"/>
         </c:scaling>
@@ -5587,7 +5587,7 @@
             <a:endParaRPr lang="en-US"/>
           </a:p>
         </c:txPr>
-        <c:crossAx val="532764864"/>
+        <c:crossAx val="200428208"/>
         <c:crosses val="autoZero"/>
         <c:crossBetween val="midCat"/>
       </c:valAx>
@@ -5825,8 +5825,8 @@
           <c:showPercent val="0"/>
           <c:showBubbleSize val="0"/>
         </c:dLbls>
-        <c:axId val="341512704"/>
-        <c:axId val="341513264"/>
+        <c:axId val="200564432"/>
+        <c:axId val="200564992"/>
         <c:extLst xmlns:c16r2="http://schemas.microsoft.com/office/drawing/2015/06/chart">
           <c:ext xmlns:c15="http://schemas.microsoft.com/office/drawing/2012/chart" uri="{02D57815-91ED-43cb-92C2-25804820EDAC}">
             <c15:filteredScatterSeries>
@@ -5961,7 +5961,7 @@
                 </c:marker>
                 <c:xVal>
                   <c:numRef>
-                    <c:extLst xmlns:c15="http://schemas.microsoft.com/office/drawing/2012/chart" xmlns:c16r2="http://schemas.microsoft.com/office/drawing/2015/06/chart">
+                    <c:extLst xmlns:c16r2="http://schemas.microsoft.com/office/drawing/2015/06/chart" xmlns:c15="http://schemas.microsoft.com/office/drawing/2012/chart">
                       <c:ext xmlns:c15="http://schemas.microsoft.com/office/drawing/2012/chart" uri="{02D57815-91ED-43cb-92C2-25804820EDAC}">
                         <c15:formulaRef>
                           <c15:sqref>'[Analytical temp (3).xlsx]pins'!$W$11:$AA$11</c15:sqref>
@@ -5991,7 +5991,7 @@
                 </c:xVal>
                 <c:yVal>
                   <c:numRef>
-                    <c:extLst xmlns:c15="http://schemas.microsoft.com/office/drawing/2012/chart" xmlns:c16r2="http://schemas.microsoft.com/office/drawing/2015/06/chart">
+                    <c:extLst xmlns:c16r2="http://schemas.microsoft.com/office/drawing/2015/06/chart" xmlns:c15="http://schemas.microsoft.com/office/drawing/2012/chart">
                       <c:ext xmlns:c15="http://schemas.microsoft.com/office/drawing/2012/chart" uri="{02D57815-91ED-43cb-92C2-25804820EDAC}">
                         <c15:formulaRef>
                           <c15:sqref>'[Analytical temp (3).xlsx]pins'!$AF$15:$AJ$15</c15:sqref>
@@ -6020,7 +6020,7 @@
                   </c:numRef>
                 </c:yVal>
                 <c:smooth val="0"/>
-                <c:extLst xmlns:c16r2="http://schemas.microsoft.com/office/drawing/2015/06/chart" xmlns:c15="http://schemas.microsoft.com/office/drawing/2012/chart">
+                <c:extLst xmlns:c15="http://schemas.microsoft.com/office/drawing/2012/chart" xmlns:c16r2="http://schemas.microsoft.com/office/drawing/2015/06/chart">
                   <c:ext xmlns:c16="http://schemas.microsoft.com/office/drawing/2014/chart" uri="{C3380CC4-5D6E-409C-BE32-E72D297353CC}">
                     <c16:uniqueId val="{00000001-55F7-4BAC-9ED7-0A0DBC995522}"/>
                   </c:ext>
@@ -6060,7 +6060,7 @@
                 </c:marker>
                 <c:xVal>
                   <c:numRef>
-                    <c:extLst xmlns:c15="http://schemas.microsoft.com/office/drawing/2012/chart" xmlns:c16r2="http://schemas.microsoft.com/office/drawing/2015/06/chart">
+                    <c:extLst xmlns:c16r2="http://schemas.microsoft.com/office/drawing/2015/06/chart" xmlns:c15="http://schemas.microsoft.com/office/drawing/2012/chart">
                       <c:ext xmlns:c15="http://schemas.microsoft.com/office/drawing/2012/chart" uri="{02D57815-91ED-43cb-92C2-25804820EDAC}">
                         <c15:formulaRef>
                           <c15:sqref>'[Analytical temp (3).xlsx]pins'!$W$11:$AA$11</c15:sqref>
@@ -6090,7 +6090,7 @@
                 </c:xVal>
                 <c:yVal>
                   <c:numRef>
-                    <c:extLst xmlns:c15="http://schemas.microsoft.com/office/drawing/2012/chart" xmlns:c16r2="http://schemas.microsoft.com/office/drawing/2015/06/chart">
+                    <c:extLst xmlns:c16r2="http://schemas.microsoft.com/office/drawing/2015/06/chart" xmlns:c15="http://schemas.microsoft.com/office/drawing/2012/chart">
                       <c:ext xmlns:c15="http://schemas.microsoft.com/office/drawing/2012/chart" uri="{02D57815-91ED-43cb-92C2-25804820EDAC}">
                         <c15:formulaRef>
                           <c15:sqref>'[Analytical temp (3).xlsx]pins'!$AF$16:$AJ$16</c15:sqref>
@@ -6119,7 +6119,7 @@
                   </c:numRef>
                 </c:yVal>
                 <c:smooth val="0"/>
-                <c:extLst xmlns:c16r2="http://schemas.microsoft.com/office/drawing/2015/06/chart" xmlns:c15="http://schemas.microsoft.com/office/drawing/2012/chart">
+                <c:extLst xmlns:c15="http://schemas.microsoft.com/office/drawing/2012/chart" xmlns:c16r2="http://schemas.microsoft.com/office/drawing/2015/06/chart">
                   <c:ext xmlns:c16="http://schemas.microsoft.com/office/drawing/2014/chart" uri="{C3380CC4-5D6E-409C-BE32-E72D297353CC}">
                     <c16:uniqueId val="{00000002-55F7-4BAC-9ED7-0A0DBC995522}"/>
                   </c:ext>
@@ -6159,7 +6159,7 @@
                 </c:marker>
                 <c:xVal>
                   <c:numRef>
-                    <c:extLst xmlns:c15="http://schemas.microsoft.com/office/drawing/2012/chart" xmlns:c16r2="http://schemas.microsoft.com/office/drawing/2015/06/chart">
+                    <c:extLst xmlns:c16r2="http://schemas.microsoft.com/office/drawing/2015/06/chart" xmlns:c15="http://schemas.microsoft.com/office/drawing/2012/chart">
                       <c:ext xmlns:c15="http://schemas.microsoft.com/office/drawing/2012/chart" uri="{02D57815-91ED-43cb-92C2-25804820EDAC}">
                         <c15:formulaRef>
                           <c15:sqref>'[Analytical temp (3).xlsx]pins'!$W$11:$AA$11</c15:sqref>
@@ -6189,7 +6189,7 @@
                 </c:xVal>
                 <c:yVal>
                   <c:numRef>
-                    <c:extLst xmlns:c15="http://schemas.microsoft.com/office/drawing/2012/chart" xmlns:c16r2="http://schemas.microsoft.com/office/drawing/2015/06/chart">
+                    <c:extLst xmlns:c16r2="http://schemas.microsoft.com/office/drawing/2015/06/chart" xmlns:c15="http://schemas.microsoft.com/office/drawing/2012/chart">
                       <c:ext xmlns:c15="http://schemas.microsoft.com/office/drawing/2012/chart" uri="{02D57815-91ED-43cb-92C2-25804820EDAC}">
                         <c15:formulaRef>
                           <c15:sqref>'[Analytical temp (3).xlsx]pins'!$AL$14:$AP$14</c15:sqref>
@@ -6253,7 +6253,7 @@
                 </c:marker>
                 <c:xVal>
                   <c:numRef>
-                    <c:extLst xmlns:c15="http://schemas.microsoft.com/office/drawing/2012/chart" xmlns:c16r2="http://schemas.microsoft.com/office/drawing/2015/06/chart">
+                    <c:extLst xmlns:c16r2="http://schemas.microsoft.com/office/drawing/2015/06/chart" xmlns:c15="http://schemas.microsoft.com/office/drawing/2012/chart">
                       <c:ext xmlns:c15="http://schemas.microsoft.com/office/drawing/2012/chart" uri="{02D57815-91ED-43cb-92C2-25804820EDAC}">
                         <c15:formulaRef>
                           <c15:sqref>'[Analytical temp (3).xlsx]pins'!$W$11:$AA$11</c15:sqref>
@@ -6283,7 +6283,7 @@
                 </c:xVal>
                 <c:yVal>
                   <c:numRef>
-                    <c:extLst xmlns:c15="http://schemas.microsoft.com/office/drawing/2012/chart" xmlns:c16r2="http://schemas.microsoft.com/office/drawing/2015/06/chart">
+                    <c:extLst xmlns:c16r2="http://schemas.microsoft.com/office/drawing/2015/06/chart" xmlns:c15="http://schemas.microsoft.com/office/drawing/2012/chart">
                       <c:ext xmlns:c15="http://schemas.microsoft.com/office/drawing/2012/chart" uri="{02D57815-91ED-43cb-92C2-25804820EDAC}">
                         <c15:formulaRef>
                           <c15:sqref>'[Analytical temp (3).xlsx]pins'!$AL$15:$AP$15</c15:sqref>
@@ -6353,7 +6353,7 @@
                 </c:marker>
                 <c:xVal>
                   <c:numRef>
-                    <c:extLst xmlns:c15="http://schemas.microsoft.com/office/drawing/2012/chart" xmlns:c16r2="http://schemas.microsoft.com/office/drawing/2015/06/chart">
+                    <c:extLst xmlns:c16r2="http://schemas.microsoft.com/office/drawing/2015/06/chart" xmlns:c15="http://schemas.microsoft.com/office/drawing/2012/chart">
                       <c:ext xmlns:c15="http://schemas.microsoft.com/office/drawing/2012/chart" uri="{02D57815-91ED-43cb-92C2-25804820EDAC}">
                         <c15:formulaRef>
                           <c15:sqref>'[Analytical temp (3).xlsx]pins'!$W$11:$AA$11</c15:sqref>
@@ -6383,7 +6383,7 @@
                 </c:xVal>
                 <c:yVal>
                   <c:numRef>
-                    <c:extLst xmlns:c15="http://schemas.microsoft.com/office/drawing/2012/chart" xmlns:c16r2="http://schemas.microsoft.com/office/drawing/2015/06/chart">
+                    <c:extLst xmlns:c16r2="http://schemas.microsoft.com/office/drawing/2015/06/chart" xmlns:c15="http://schemas.microsoft.com/office/drawing/2012/chart">
                       <c:ext xmlns:c15="http://schemas.microsoft.com/office/drawing/2012/chart" uri="{02D57815-91ED-43cb-92C2-25804820EDAC}">
                         <c15:formulaRef>
                           <c15:sqref>'[Analytical temp (3).xlsx]pins'!$AL$16:$AP$16</c15:sqref>
@@ -6418,7 +6418,7 @@
         </c:extLst>
       </c:scatterChart>
       <c:valAx>
-        <c:axId val="341512704"/>
+        <c:axId val="200564432"/>
         <c:scaling>
           <c:orientation val="minMax"/>
         </c:scaling>
@@ -6531,12 +6531,12 @@
             <a:endParaRPr lang="en-US"/>
           </a:p>
         </c:txPr>
-        <c:crossAx val="341513264"/>
+        <c:crossAx val="200564992"/>
         <c:crosses val="autoZero"/>
         <c:crossBetween val="midCat"/>
       </c:valAx>
       <c:valAx>
-        <c:axId val="341513264"/>
+        <c:axId val="200564992"/>
         <c:scaling>
           <c:orientation val="minMax"/>
         </c:scaling>
@@ -6649,7 +6649,7 @@
             <a:endParaRPr lang="en-US"/>
           </a:p>
         </c:txPr>
-        <c:crossAx val="341512704"/>
+        <c:crossAx val="200564432"/>
         <c:crosses val="autoZero"/>
         <c:crossBetween val="midCat"/>
       </c:valAx>
@@ -6887,8 +6887,8 @@
           <c:showPercent val="0"/>
           <c:showBubbleSize val="0"/>
         </c:dLbls>
-        <c:axId val="531475936"/>
-        <c:axId val="531476496"/>
+        <c:axId val="200839360"/>
+        <c:axId val="200839920"/>
         <c:extLst xmlns:c16r2="http://schemas.microsoft.com/office/drawing/2015/06/chart">
           <c:ext xmlns:c15="http://schemas.microsoft.com/office/drawing/2012/chart" uri="{02D57815-91ED-43cb-92C2-25804820EDAC}">
             <c15:filteredScatterSeries>
@@ -7023,7 +7023,7 @@
                 </c:marker>
                 <c:xVal>
                   <c:numRef>
-                    <c:extLst xmlns:c15="http://schemas.microsoft.com/office/drawing/2012/chart" xmlns:c16r2="http://schemas.microsoft.com/office/drawing/2015/06/chart">
+                    <c:extLst xmlns:c16r2="http://schemas.microsoft.com/office/drawing/2015/06/chart" xmlns:c15="http://schemas.microsoft.com/office/drawing/2012/chart">
                       <c:ext xmlns:c15="http://schemas.microsoft.com/office/drawing/2012/chart" uri="{02D57815-91ED-43cb-92C2-25804820EDAC}">
                         <c15:formulaRef>
                           <c15:sqref>'[Analytical temp (3).xlsx]pins'!$W$11:$AA$11</c15:sqref>
@@ -7053,7 +7053,7 @@
                 </c:xVal>
                 <c:yVal>
                   <c:numRef>
-                    <c:extLst xmlns:c15="http://schemas.microsoft.com/office/drawing/2012/chart" xmlns:c16r2="http://schemas.microsoft.com/office/drawing/2015/06/chart">
+                    <c:extLst xmlns:c16r2="http://schemas.microsoft.com/office/drawing/2015/06/chart" xmlns:c15="http://schemas.microsoft.com/office/drawing/2012/chart">
                       <c:ext xmlns:c15="http://schemas.microsoft.com/office/drawing/2012/chart" uri="{02D57815-91ED-43cb-92C2-25804820EDAC}">
                         <c15:formulaRef>
                           <c15:sqref>'[Analytical temp (3).xlsx]pins'!$AF$15:$AJ$15</c15:sqref>
@@ -7082,7 +7082,7 @@
                   </c:numRef>
                 </c:yVal>
                 <c:smooth val="0"/>
-                <c:extLst xmlns:c16r2="http://schemas.microsoft.com/office/drawing/2015/06/chart" xmlns:c15="http://schemas.microsoft.com/office/drawing/2012/chart">
+                <c:extLst xmlns:c15="http://schemas.microsoft.com/office/drawing/2012/chart" xmlns:c16r2="http://schemas.microsoft.com/office/drawing/2015/06/chart">
                   <c:ext xmlns:c16="http://schemas.microsoft.com/office/drawing/2014/chart" uri="{C3380CC4-5D6E-409C-BE32-E72D297353CC}">
                     <c16:uniqueId val="{00000001-55F7-4BAC-9ED7-0A0DBC995522}"/>
                   </c:ext>
@@ -7122,7 +7122,7 @@
                 </c:marker>
                 <c:xVal>
                   <c:numRef>
-                    <c:extLst xmlns:c15="http://schemas.microsoft.com/office/drawing/2012/chart" xmlns:c16r2="http://schemas.microsoft.com/office/drawing/2015/06/chart">
+                    <c:extLst xmlns:c16r2="http://schemas.microsoft.com/office/drawing/2015/06/chart" xmlns:c15="http://schemas.microsoft.com/office/drawing/2012/chart">
                       <c:ext xmlns:c15="http://schemas.microsoft.com/office/drawing/2012/chart" uri="{02D57815-91ED-43cb-92C2-25804820EDAC}">
                         <c15:formulaRef>
                           <c15:sqref>'[Analytical temp (3).xlsx]pins'!$W$11:$AA$11</c15:sqref>
@@ -7152,7 +7152,7 @@
                 </c:xVal>
                 <c:yVal>
                   <c:numRef>
-                    <c:extLst xmlns:c15="http://schemas.microsoft.com/office/drawing/2012/chart" xmlns:c16r2="http://schemas.microsoft.com/office/drawing/2015/06/chart">
+                    <c:extLst xmlns:c16r2="http://schemas.microsoft.com/office/drawing/2015/06/chart" xmlns:c15="http://schemas.microsoft.com/office/drawing/2012/chart">
                       <c:ext xmlns:c15="http://schemas.microsoft.com/office/drawing/2012/chart" uri="{02D57815-91ED-43cb-92C2-25804820EDAC}">
                         <c15:formulaRef>
                           <c15:sqref>'[Analytical temp (3).xlsx]pins'!$AF$16:$AJ$16</c15:sqref>
@@ -7181,7 +7181,7 @@
                   </c:numRef>
                 </c:yVal>
                 <c:smooth val="0"/>
-                <c:extLst xmlns:c16r2="http://schemas.microsoft.com/office/drawing/2015/06/chart" xmlns:c15="http://schemas.microsoft.com/office/drawing/2012/chart">
+                <c:extLst xmlns:c15="http://schemas.microsoft.com/office/drawing/2012/chart" xmlns:c16r2="http://schemas.microsoft.com/office/drawing/2015/06/chart">
                   <c:ext xmlns:c16="http://schemas.microsoft.com/office/drawing/2014/chart" uri="{C3380CC4-5D6E-409C-BE32-E72D297353CC}">
                     <c16:uniqueId val="{00000002-55F7-4BAC-9ED7-0A0DBC995522}"/>
                   </c:ext>
@@ -7221,7 +7221,7 @@
                 </c:marker>
                 <c:xVal>
                   <c:numRef>
-                    <c:extLst xmlns:c15="http://schemas.microsoft.com/office/drawing/2012/chart" xmlns:c16r2="http://schemas.microsoft.com/office/drawing/2015/06/chart">
+                    <c:extLst xmlns:c16r2="http://schemas.microsoft.com/office/drawing/2015/06/chart" xmlns:c15="http://schemas.microsoft.com/office/drawing/2012/chart">
                       <c:ext xmlns:c15="http://schemas.microsoft.com/office/drawing/2012/chart" uri="{02D57815-91ED-43cb-92C2-25804820EDAC}">
                         <c15:formulaRef>
                           <c15:sqref>'[Analytical temp (3).xlsx]pins'!$W$11:$AA$11</c15:sqref>
@@ -7251,7 +7251,7 @@
                 </c:xVal>
                 <c:yVal>
                   <c:numRef>
-                    <c:extLst xmlns:c15="http://schemas.microsoft.com/office/drawing/2012/chart" xmlns:c16r2="http://schemas.microsoft.com/office/drawing/2015/06/chart">
+                    <c:extLst xmlns:c16r2="http://schemas.microsoft.com/office/drawing/2015/06/chart" xmlns:c15="http://schemas.microsoft.com/office/drawing/2012/chart">
                       <c:ext xmlns:c15="http://schemas.microsoft.com/office/drawing/2012/chart" uri="{02D57815-91ED-43cb-92C2-25804820EDAC}">
                         <c15:formulaRef>
                           <c15:sqref>'[Analytical temp (3).xlsx]pins'!$AL$14:$AP$14</c15:sqref>
@@ -7315,7 +7315,7 @@
                 </c:marker>
                 <c:xVal>
                   <c:numRef>
-                    <c:extLst xmlns:c15="http://schemas.microsoft.com/office/drawing/2012/chart" xmlns:c16r2="http://schemas.microsoft.com/office/drawing/2015/06/chart">
+                    <c:extLst xmlns:c16r2="http://schemas.microsoft.com/office/drawing/2015/06/chart" xmlns:c15="http://schemas.microsoft.com/office/drawing/2012/chart">
                       <c:ext xmlns:c15="http://schemas.microsoft.com/office/drawing/2012/chart" uri="{02D57815-91ED-43cb-92C2-25804820EDAC}">
                         <c15:formulaRef>
                           <c15:sqref>'[Analytical temp (3).xlsx]pins'!$W$11:$AA$11</c15:sqref>
@@ -7345,7 +7345,7 @@
                 </c:xVal>
                 <c:yVal>
                   <c:numRef>
-                    <c:extLst xmlns:c15="http://schemas.microsoft.com/office/drawing/2012/chart" xmlns:c16r2="http://schemas.microsoft.com/office/drawing/2015/06/chart">
+                    <c:extLst xmlns:c16r2="http://schemas.microsoft.com/office/drawing/2015/06/chart" xmlns:c15="http://schemas.microsoft.com/office/drawing/2012/chart">
                       <c:ext xmlns:c15="http://schemas.microsoft.com/office/drawing/2012/chart" uri="{02D57815-91ED-43cb-92C2-25804820EDAC}">
                         <c15:formulaRef>
                           <c15:sqref>'[Analytical temp (3).xlsx]pins'!$AL$15:$AP$15</c15:sqref>
@@ -7415,7 +7415,7 @@
                 </c:marker>
                 <c:xVal>
                   <c:numRef>
-                    <c:extLst xmlns:c15="http://schemas.microsoft.com/office/drawing/2012/chart" xmlns:c16r2="http://schemas.microsoft.com/office/drawing/2015/06/chart">
+                    <c:extLst xmlns:c16r2="http://schemas.microsoft.com/office/drawing/2015/06/chart" xmlns:c15="http://schemas.microsoft.com/office/drawing/2012/chart">
                       <c:ext xmlns:c15="http://schemas.microsoft.com/office/drawing/2012/chart" uri="{02D57815-91ED-43cb-92C2-25804820EDAC}">
                         <c15:formulaRef>
                           <c15:sqref>'[Analytical temp (3).xlsx]pins'!$W$11:$AA$11</c15:sqref>
@@ -7445,7 +7445,7 @@
                 </c:xVal>
                 <c:yVal>
                   <c:numRef>
-                    <c:extLst xmlns:c15="http://schemas.microsoft.com/office/drawing/2012/chart" xmlns:c16r2="http://schemas.microsoft.com/office/drawing/2015/06/chart">
+                    <c:extLst xmlns:c16r2="http://schemas.microsoft.com/office/drawing/2015/06/chart" xmlns:c15="http://schemas.microsoft.com/office/drawing/2012/chart">
                       <c:ext xmlns:c15="http://schemas.microsoft.com/office/drawing/2012/chart" uri="{02D57815-91ED-43cb-92C2-25804820EDAC}">
                         <c15:formulaRef>
                           <c15:sqref>'[Analytical temp (3).xlsx]pins'!$AL$16:$AP$16</c15:sqref>
@@ -7480,7 +7480,7 @@
         </c:extLst>
       </c:scatterChart>
       <c:valAx>
-        <c:axId val="531475936"/>
+        <c:axId val="200839360"/>
         <c:scaling>
           <c:orientation val="minMax"/>
         </c:scaling>
@@ -7593,12 +7593,12 @@
             <a:endParaRPr lang="en-US"/>
           </a:p>
         </c:txPr>
-        <c:crossAx val="531476496"/>
+        <c:crossAx val="200839920"/>
         <c:crosses val="autoZero"/>
         <c:crossBetween val="midCat"/>
       </c:valAx>
       <c:valAx>
-        <c:axId val="531476496"/>
+        <c:axId val="200839920"/>
         <c:scaling>
           <c:orientation val="minMax"/>
         </c:scaling>
@@ -7711,7 +7711,7 @@
             <a:endParaRPr lang="en-US"/>
           </a:p>
         </c:txPr>
-        <c:crossAx val="531475936"/>
+        <c:crossAx val="200839360"/>
         <c:crosses val="autoZero"/>
         <c:crossBetween val="midCat"/>
       </c:valAx>
@@ -7949,8 +7949,8 @@
           <c:showPercent val="0"/>
           <c:showBubbleSize val="0"/>
         </c:dLbls>
-        <c:axId val="531482656"/>
-        <c:axId val="531483216"/>
+        <c:axId val="200846080"/>
+        <c:axId val="200846640"/>
         <c:extLst xmlns:c16r2="http://schemas.microsoft.com/office/drawing/2015/06/chart">
           <c:ext xmlns:c15="http://schemas.microsoft.com/office/drawing/2012/chart" uri="{02D57815-91ED-43cb-92C2-25804820EDAC}">
             <c15:filteredScatterSeries>
@@ -8085,7 +8085,7 @@
                 </c:marker>
                 <c:xVal>
                   <c:numRef>
-                    <c:extLst xmlns:c15="http://schemas.microsoft.com/office/drawing/2012/chart" xmlns:c16r2="http://schemas.microsoft.com/office/drawing/2015/06/chart">
+                    <c:extLst xmlns:c16r2="http://schemas.microsoft.com/office/drawing/2015/06/chart" xmlns:c15="http://schemas.microsoft.com/office/drawing/2012/chart">
                       <c:ext xmlns:c15="http://schemas.microsoft.com/office/drawing/2012/chart" uri="{02D57815-91ED-43cb-92C2-25804820EDAC}">
                         <c15:formulaRef>
                           <c15:sqref>'[Analytical temp (3).xlsx]pins'!$W$11:$AA$11</c15:sqref>
@@ -8115,7 +8115,7 @@
                 </c:xVal>
                 <c:yVal>
                   <c:numRef>
-                    <c:extLst xmlns:c15="http://schemas.microsoft.com/office/drawing/2012/chart" xmlns:c16r2="http://schemas.microsoft.com/office/drawing/2015/06/chart">
+                    <c:extLst xmlns:c16r2="http://schemas.microsoft.com/office/drawing/2015/06/chart" xmlns:c15="http://schemas.microsoft.com/office/drawing/2012/chart">
                       <c:ext xmlns:c15="http://schemas.microsoft.com/office/drawing/2012/chart" uri="{02D57815-91ED-43cb-92C2-25804820EDAC}">
                         <c15:formulaRef>
                           <c15:sqref>'[Analytical temp (3).xlsx]pins'!$AF$15:$AJ$15</c15:sqref>
@@ -8144,7 +8144,7 @@
                   </c:numRef>
                 </c:yVal>
                 <c:smooth val="0"/>
-                <c:extLst xmlns:c16r2="http://schemas.microsoft.com/office/drawing/2015/06/chart" xmlns:c15="http://schemas.microsoft.com/office/drawing/2012/chart">
+                <c:extLst xmlns:c15="http://schemas.microsoft.com/office/drawing/2012/chart" xmlns:c16r2="http://schemas.microsoft.com/office/drawing/2015/06/chart">
                   <c:ext xmlns:c16="http://schemas.microsoft.com/office/drawing/2014/chart" uri="{C3380CC4-5D6E-409C-BE32-E72D297353CC}">
                     <c16:uniqueId val="{00000001-55F7-4BAC-9ED7-0A0DBC995522}"/>
                   </c:ext>
@@ -8184,7 +8184,7 @@
                 </c:marker>
                 <c:xVal>
                   <c:numRef>
-                    <c:extLst xmlns:c15="http://schemas.microsoft.com/office/drawing/2012/chart" xmlns:c16r2="http://schemas.microsoft.com/office/drawing/2015/06/chart">
+                    <c:extLst xmlns:c16r2="http://schemas.microsoft.com/office/drawing/2015/06/chart" xmlns:c15="http://schemas.microsoft.com/office/drawing/2012/chart">
                       <c:ext xmlns:c15="http://schemas.microsoft.com/office/drawing/2012/chart" uri="{02D57815-91ED-43cb-92C2-25804820EDAC}">
                         <c15:formulaRef>
                           <c15:sqref>'[Analytical temp (3).xlsx]pins'!$W$11:$AA$11</c15:sqref>
@@ -8214,7 +8214,7 @@
                 </c:xVal>
                 <c:yVal>
                   <c:numRef>
-                    <c:extLst xmlns:c15="http://schemas.microsoft.com/office/drawing/2012/chart" xmlns:c16r2="http://schemas.microsoft.com/office/drawing/2015/06/chart">
+                    <c:extLst xmlns:c16r2="http://schemas.microsoft.com/office/drawing/2015/06/chart" xmlns:c15="http://schemas.microsoft.com/office/drawing/2012/chart">
                       <c:ext xmlns:c15="http://schemas.microsoft.com/office/drawing/2012/chart" uri="{02D57815-91ED-43cb-92C2-25804820EDAC}">
                         <c15:formulaRef>
                           <c15:sqref>'[Analytical temp (3).xlsx]pins'!$AF$16:$AJ$16</c15:sqref>
@@ -8243,7 +8243,7 @@
                   </c:numRef>
                 </c:yVal>
                 <c:smooth val="0"/>
-                <c:extLst xmlns:c16r2="http://schemas.microsoft.com/office/drawing/2015/06/chart" xmlns:c15="http://schemas.microsoft.com/office/drawing/2012/chart">
+                <c:extLst xmlns:c15="http://schemas.microsoft.com/office/drawing/2012/chart" xmlns:c16r2="http://schemas.microsoft.com/office/drawing/2015/06/chart">
                   <c:ext xmlns:c16="http://schemas.microsoft.com/office/drawing/2014/chart" uri="{C3380CC4-5D6E-409C-BE32-E72D297353CC}">
                     <c16:uniqueId val="{00000002-55F7-4BAC-9ED7-0A0DBC995522}"/>
                   </c:ext>
@@ -8283,7 +8283,7 @@
                 </c:marker>
                 <c:xVal>
                   <c:numRef>
-                    <c:extLst xmlns:c15="http://schemas.microsoft.com/office/drawing/2012/chart" xmlns:c16r2="http://schemas.microsoft.com/office/drawing/2015/06/chart">
+                    <c:extLst xmlns:c16r2="http://schemas.microsoft.com/office/drawing/2015/06/chart" xmlns:c15="http://schemas.microsoft.com/office/drawing/2012/chart">
                       <c:ext xmlns:c15="http://schemas.microsoft.com/office/drawing/2012/chart" uri="{02D57815-91ED-43cb-92C2-25804820EDAC}">
                         <c15:formulaRef>
                           <c15:sqref>'[Analytical temp (3).xlsx]pins'!$W$11:$AA$11</c15:sqref>
@@ -8313,7 +8313,7 @@
                 </c:xVal>
                 <c:yVal>
                   <c:numRef>
-                    <c:extLst xmlns:c15="http://schemas.microsoft.com/office/drawing/2012/chart" xmlns:c16r2="http://schemas.microsoft.com/office/drawing/2015/06/chart">
+                    <c:extLst xmlns:c16r2="http://schemas.microsoft.com/office/drawing/2015/06/chart" xmlns:c15="http://schemas.microsoft.com/office/drawing/2012/chart">
                       <c:ext xmlns:c15="http://schemas.microsoft.com/office/drawing/2012/chart" uri="{02D57815-91ED-43cb-92C2-25804820EDAC}">
                         <c15:formulaRef>
                           <c15:sqref>'[Analytical temp (3).xlsx]pins'!$AL$14:$AP$14</c15:sqref>
@@ -8377,7 +8377,7 @@
                 </c:marker>
                 <c:xVal>
                   <c:numRef>
-                    <c:extLst xmlns:c15="http://schemas.microsoft.com/office/drawing/2012/chart" xmlns:c16r2="http://schemas.microsoft.com/office/drawing/2015/06/chart">
+                    <c:extLst xmlns:c16r2="http://schemas.microsoft.com/office/drawing/2015/06/chart" xmlns:c15="http://schemas.microsoft.com/office/drawing/2012/chart">
                       <c:ext xmlns:c15="http://schemas.microsoft.com/office/drawing/2012/chart" uri="{02D57815-91ED-43cb-92C2-25804820EDAC}">
                         <c15:formulaRef>
                           <c15:sqref>'[Analytical temp (3).xlsx]pins'!$W$11:$AA$11</c15:sqref>
@@ -8407,7 +8407,7 @@
                 </c:xVal>
                 <c:yVal>
                   <c:numRef>
-                    <c:extLst xmlns:c15="http://schemas.microsoft.com/office/drawing/2012/chart" xmlns:c16r2="http://schemas.microsoft.com/office/drawing/2015/06/chart">
+                    <c:extLst xmlns:c16r2="http://schemas.microsoft.com/office/drawing/2015/06/chart" xmlns:c15="http://schemas.microsoft.com/office/drawing/2012/chart">
                       <c:ext xmlns:c15="http://schemas.microsoft.com/office/drawing/2012/chart" uri="{02D57815-91ED-43cb-92C2-25804820EDAC}">
                         <c15:formulaRef>
                           <c15:sqref>'[Analytical temp (3).xlsx]pins'!$AL$15:$AP$15</c15:sqref>
@@ -8477,7 +8477,7 @@
                 </c:marker>
                 <c:xVal>
                   <c:numRef>
-                    <c:extLst xmlns:c15="http://schemas.microsoft.com/office/drawing/2012/chart" xmlns:c16r2="http://schemas.microsoft.com/office/drawing/2015/06/chart">
+                    <c:extLst xmlns:c16r2="http://schemas.microsoft.com/office/drawing/2015/06/chart" xmlns:c15="http://schemas.microsoft.com/office/drawing/2012/chart">
                       <c:ext xmlns:c15="http://schemas.microsoft.com/office/drawing/2012/chart" uri="{02D57815-91ED-43cb-92C2-25804820EDAC}">
                         <c15:formulaRef>
                           <c15:sqref>'[Analytical temp (3).xlsx]pins'!$W$11:$AA$11</c15:sqref>
@@ -8507,7 +8507,7 @@
                 </c:xVal>
                 <c:yVal>
                   <c:numRef>
-                    <c:extLst xmlns:c15="http://schemas.microsoft.com/office/drawing/2012/chart" xmlns:c16r2="http://schemas.microsoft.com/office/drawing/2015/06/chart">
+                    <c:extLst xmlns:c16r2="http://schemas.microsoft.com/office/drawing/2015/06/chart" xmlns:c15="http://schemas.microsoft.com/office/drawing/2012/chart">
                       <c:ext xmlns:c15="http://schemas.microsoft.com/office/drawing/2012/chart" uri="{02D57815-91ED-43cb-92C2-25804820EDAC}">
                         <c15:formulaRef>
                           <c15:sqref>'[Analytical temp (3).xlsx]pins'!$AL$16:$AP$16</c15:sqref>
@@ -8542,7 +8542,7 @@
         </c:extLst>
       </c:scatterChart>
       <c:valAx>
-        <c:axId val="531482656"/>
+        <c:axId val="200846080"/>
         <c:scaling>
           <c:orientation val="minMax"/>
         </c:scaling>
@@ -8655,12 +8655,12 @@
             <a:endParaRPr lang="en-US"/>
           </a:p>
         </c:txPr>
-        <c:crossAx val="531483216"/>
+        <c:crossAx val="200846640"/>
         <c:crosses val="autoZero"/>
         <c:crossBetween val="midCat"/>
       </c:valAx>
       <c:valAx>
-        <c:axId val="531483216"/>
+        <c:axId val="200846640"/>
         <c:scaling>
           <c:orientation val="minMax"/>
         </c:scaling>
@@ -8773,7 +8773,7 @@
             <a:endParaRPr lang="en-US"/>
           </a:p>
         </c:txPr>
-        <c:crossAx val="531482656"/>
+        <c:crossAx val="200846080"/>
         <c:crosses val="autoZero"/>
         <c:crossBetween val="midCat"/>
       </c:valAx>
@@ -10532,11 +10532,11 @@
           <c:showPercent val="0"/>
           <c:showBubbleSize val="0"/>
         </c:dLbls>
-        <c:axId val="332470272"/>
-        <c:axId val="332468592"/>
+        <c:axId val="205470192"/>
+        <c:axId val="205470752"/>
       </c:scatterChart>
       <c:valAx>
-        <c:axId val="332470272"/>
+        <c:axId val="205470192"/>
         <c:scaling>
           <c:logBase val="10"/>
           <c:orientation val="minMax"/>
@@ -10584,7 +10584,6 @@
               </a:p>
             </c:rich>
           </c:tx>
-          <c:layout/>
           <c:overlay val="0"/>
           <c:spPr>
             <a:noFill/>
@@ -10631,12 +10630,12 @@
             <a:endParaRPr lang="en-US"/>
           </a:p>
         </c:txPr>
-        <c:crossAx val="332468592"/>
+        <c:crossAx val="205470752"/>
         <c:crosses val="autoZero"/>
         <c:crossBetween val="midCat"/>
       </c:valAx>
       <c:valAx>
-        <c:axId val="332468592"/>
+        <c:axId val="205470752"/>
         <c:scaling>
           <c:logBase val="10"/>
           <c:orientation val="minMax"/>
@@ -10686,7 +10685,6 @@
               </a:p>
             </c:rich>
           </c:tx>
-          <c:layout/>
           <c:overlay val="0"/>
           <c:spPr>
             <a:noFill/>
@@ -10733,7 +10731,7 @@
             <a:endParaRPr lang="en-US"/>
           </a:p>
         </c:txPr>
-        <c:crossAx val="332470272"/>
+        <c:crossAx val="205470192"/>
         <c:crosses val="autoZero"/>
         <c:crossBetween val="midCat"/>
       </c:valAx>
@@ -11181,8 +11179,8 @@
           <c:showPercent val="0"/>
           <c:showBubbleSize val="0"/>
         </c:dLbls>
-        <c:axId val="181066592"/>
-        <c:axId val="181067152"/>
+        <c:axId val="199248400"/>
+        <c:axId val="199248960"/>
         <c:extLst xmlns:c16r2="http://schemas.microsoft.com/office/drawing/2015/06/chart">
           <c:ext xmlns:c15="http://schemas.microsoft.com/office/drawing/2012/chart" uri="{02D57815-91ED-43cb-92C2-25804820EDAC}">
             <c15:filteredScatterSeries>
@@ -11288,7 +11286,7 @@
         </c:extLst>
       </c:scatterChart>
       <c:valAx>
-        <c:axId val="181066592"/>
+        <c:axId val="199248400"/>
         <c:scaling>
           <c:orientation val="minMax"/>
         </c:scaling>
@@ -11334,7 +11332,6 @@
               </a:p>
             </c:rich>
           </c:tx>
-          <c:layout/>
           <c:overlay val="0"/>
           <c:spPr>
             <a:noFill/>
@@ -11401,12 +11398,12 @@
             <a:endParaRPr lang="en-US"/>
           </a:p>
         </c:txPr>
-        <c:crossAx val="181067152"/>
+        <c:crossAx val="199248960"/>
         <c:crosses val="autoZero"/>
         <c:crossBetween val="midCat"/>
       </c:valAx>
       <c:valAx>
-        <c:axId val="181067152"/>
+        <c:axId val="199248960"/>
         <c:scaling>
           <c:orientation val="minMax"/>
         </c:scaling>
@@ -11452,7 +11449,6 @@
               </a:p>
             </c:rich>
           </c:tx>
-          <c:layout/>
           <c:overlay val="0"/>
           <c:spPr>
             <a:noFill/>
@@ -11519,7 +11515,7 @@
             <a:endParaRPr lang="en-US"/>
           </a:p>
         </c:txPr>
-        <c:crossAx val="181066592"/>
+        <c:crossAx val="199248400"/>
         <c:crosses val="autoZero"/>
         <c:crossBetween val="midCat"/>
       </c:valAx>
@@ -11533,7 +11529,6 @@
     </c:plotArea>
     <c:legend>
       <c:legendPos val="r"/>
-      <c:layout/>
       <c:overlay val="0"/>
       <c:spPr>
         <a:noFill/>
@@ -11958,8 +11953,8 @@
           <c:showPercent val="0"/>
           <c:showBubbleSize val="0"/>
         </c:dLbls>
-        <c:axId val="181071632"/>
-        <c:axId val="181072192"/>
+        <c:axId val="199253440"/>
+        <c:axId val="148920016"/>
         <c:extLst xmlns:c16r2="http://schemas.microsoft.com/office/drawing/2015/06/chart">
           <c:ext xmlns:c15="http://schemas.microsoft.com/office/drawing/2012/chart" uri="{02D57815-91ED-43cb-92C2-25804820EDAC}">
             <c15:filteredScatterSeries>
@@ -12065,7 +12060,7 @@
         </c:extLst>
       </c:scatterChart>
       <c:valAx>
-        <c:axId val="181071632"/>
+        <c:axId val="199253440"/>
         <c:scaling>
           <c:orientation val="minMax"/>
         </c:scaling>
@@ -12111,7 +12106,6 @@
               </a:p>
             </c:rich>
           </c:tx>
-          <c:layout/>
           <c:overlay val="0"/>
           <c:spPr>
             <a:noFill/>
@@ -12178,12 +12172,12 @@
             <a:endParaRPr lang="en-US"/>
           </a:p>
         </c:txPr>
-        <c:crossAx val="181072192"/>
+        <c:crossAx val="148920016"/>
         <c:crosses val="autoZero"/>
         <c:crossBetween val="midCat"/>
       </c:valAx>
       <c:valAx>
-        <c:axId val="181072192"/>
+        <c:axId val="148920016"/>
         <c:scaling>
           <c:orientation val="minMax"/>
         </c:scaling>
@@ -12229,7 +12223,6 @@
               </a:p>
             </c:rich>
           </c:tx>
-          <c:layout/>
           <c:overlay val="0"/>
           <c:spPr>
             <a:noFill/>
@@ -12296,7 +12289,7 @@
             <a:endParaRPr lang="en-US"/>
           </a:p>
         </c:txPr>
-        <c:crossAx val="181071632"/>
+        <c:crossAx val="199253440"/>
         <c:crosses val="autoZero"/>
         <c:crossBetween val="midCat"/>
       </c:valAx>
@@ -12310,7 +12303,6 @@
     </c:plotArea>
     <c:legend>
       <c:legendPos val="r"/>
-      <c:layout/>
       <c:overlay val="0"/>
       <c:spPr>
         <a:noFill/>
@@ -12566,8 +12558,8 @@
           <c:showPercent val="0"/>
           <c:showBubbleSize val="0"/>
         </c:dLbls>
-        <c:axId val="181077232"/>
-        <c:axId val="181077792"/>
+        <c:axId val="199266256"/>
+        <c:axId val="199266816"/>
         <c:extLst xmlns:c16r2="http://schemas.microsoft.com/office/drawing/2015/06/chart">
           <c:ext xmlns:c15="http://schemas.microsoft.com/office/drawing/2012/chart" uri="{02D57815-91ED-43cb-92C2-25804820EDAC}">
             <c15:filteredScatterSeries>
@@ -12702,7 +12694,7 @@
                 </c:marker>
                 <c:xVal>
                   <c:numRef>
-                    <c:extLst xmlns:c15="http://schemas.microsoft.com/office/drawing/2012/chart" xmlns:c16r2="http://schemas.microsoft.com/office/drawing/2015/06/chart">
+                    <c:extLst xmlns:c16r2="http://schemas.microsoft.com/office/drawing/2015/06/chart" xmlns:c15="http://schemas.microsoft.com/office/drawing/2012/chart">
                       <c:ext xmlns:c15="http://schemas.microsoft.com/office/drawing/2012/chart" uri="{02D57815-91ED-43cb-92C2-25804820EDAC}">
                         <c15:formulaRef>
                           <c15:sqref>'[Analytical temp (3).xlsx]pins'!$W$11:$AA$11</c15:sqref>
@@ -12732,7 +12724,7 @@
                 </c:xVal>
                 <c:yVal>
                   <c:numRef>
-                    <c:extLst xmlns:c15="http://schemas.microsoft.com/office/drawing/2012/chart" xmlns:c16r2="http://schemas.microsoft.com/office/drawing/2015/06/chart">
+                    <c:extLst xmlns:c16r2="http://schemas.microsoft.com/office/drawing/2015/06/chart" xmlns:c15="http://schemas.microsoft.com/office/drawing/2012/chart">
                       <c:ext xmlns:c15="http://schemas.microsoft.com/office/drawing/2012/chart" uri="{02D57815-91ED-43cb-92C2-25804820EDAC}">
                         <c15:formulaRef>
                           <c15:sqref>'[Analytical temp (3).xlsx]pins'!$AF$15:$AJ$15</c15:sqref>
@@ -12761,7 +12753,7 @@
                   </c:numRef>
                 </c:yVal>
                 <c:smooth val="0"/>
-                <c:extLst xmlns:c16r2="http://schemas.microsoft.com/office/drawing/2015/06/chart" xmlns:c15="http://schemas.microsoft.com/office/drawing/2012/chart">
+                <c:extLst xmlns:c15="http://schemas.microsoft.com/office/drawing/2012/chart" xmlns:c16r2="http://schemas.microsoft.com/office/drawing/2015/06/chart">
                   <c:ext xmlns:c16="http://schemas.microsoft.com/office/drawing/2014/chart" uri="{C3380CC4-5D6E-409C-BE32-E72D297353CC}">
                     <c16:uniqueId val="{00000001-55F7-4BAC-9ED7-0A0DBC995522}"/>
                   </c:ext>
@@ -12801,7 +12793,7 @@
                 </c:marker>
                 <c:xVal>
                   <c:numRef>
-                    <c:extLst xmlns:c15="http://schemas.microsoft.com/office/drawing/2012/chart" xmlns:c16r2="http://schemas.microsoft.com/office/drawing/2015/06/chart">
+                    <c:extLst xmlns:c16r2="http://schemas.microsoft.com/office/drawing/2015/06/chart" xmlns:c15="http://schemas.microsoft.com/office/drawing/2012/chart">
                       <c:ext xmlns:c15="http://schemas.microsoft.com/office/drawing/2012/chart" uri="{02D57815-91ED-43cb-92C2-25804820EDAC}">
                         <c15:formulaRef>
                           <c15:sqref>'[Analytical temp (3).xlsx]pins'!$W$11:$AA$11</c15:sqref>
@@ -12831,7 +12823,7 @@
                 </c:xVal>
                 <c:yVal>
                   <c:numRef>
-                    <c:extLst xmlns:c15="http://schemas.microsoft.com/office/drawing/2012/chart" xmlns:c16r2="http://schemas.microsoft.com/office/drawing/2015/06/chart">
+                    <c:extLst xmlns:c16r2="http://schemas.microsoft.com/office/drawing/2015/06/chart" xmlns:c15="http://schemas.microsoft.com/office/drawing/2012/chart">
                       <c:ext xmlns:c15="http://schemas.microsoft.com/office/drawing/2012/chart" uri="{02D57815-91ED-43cb-92C2-25804820EDAC}">
                         <c15:formulaRef>
                           <c15:sqref>'[Analytical temp (3).xlsx]pins'!$AF$16:$AJ$16</c15:sqref>
@@ -12860,7 +12852,7 @@
                   </c:numRef>
                 </c:yVal>
                 <c:smooth val="0"/>
-                <c:extLst xmlns:c16r2="http://schemas.microsoft.com/office/drawing/2015/06/chart" xmlns:c15="http://schemas.microsoft.com/office/drawing/2012/chart">
+                <c:extLst xmlns:c15="http://schemas.microsoft.com/office/drawing/2012/chart" xmlns:c16r2="http://schemas.microsoft.com/office/drawing/2015/06/chart">
                   <c:ext xmlns:c16="http://schemas.microsoft.com/office/drawing/2014/chart" uri="{C3380CC4-5D6E-409C-BE32-E72D297353CC}">
                     <c16:uniqueId val="{00000002-55F7-4BAC-9ED7-0A0DBC995522}"/>
                   </c:ext>
@@ -12900,7 +12892,7 @@
                 </c:marker>
                 <c:xVal>
                   <c:numRef>
-                    <c:extLst xmlns:c15="http://schemas.microsoft.com/office/drawing/2012/chart" xmlns:c16r2="http://schemas.microsoft.com/office/drawing/2015/06/chart">
+                    <c:extLst xmlns:c16r2="http://schemas.microsoft.com/office/drawing/2015/06/chart" xmlns:c15="http://schemas.microsoft.com/office/drawing/2012/chart">
                       <c:ext xmlns:c15="http://schemas.microsoft.com/office/drawing/2012/chart" uri="{02D57815-91ED-43cb-92C2-25804820EDAC}">
                         <c15:formulaRef>
                           <c15:sqref>'[Analytical temp (3).xlsx]pins'!$W$11:$AA$11</c15:sqref>
@@ -12930,7 +12922,7 @@
                 </c:xVal>
                 <c:yVal>
                   <c:numRef>
-                    <c:extLst xmlns:c15="http://schemas.microsoft.com/office/drawing/2012/chart" xmlns:c16r2="http://schemas.microsoft.com/office/drawing/2015/06/chart">
+                    <c:extLst xmlns:c16r2="http://schemas.microsoft.com/office/drawing/2015/06/chart" xmlns:c15="http://schemas.microsoft.com/office/drawing/2012/chart">
                       <c:ext xmlns:c15="http://schemas.microsoft.com/office/drawing/2012/chart" uri="{02D57815-91ED-43cb-92C2-25804820EDAC}">
                         <c15:formulaRef>
                           <c15:sqref>'[Analytical temp (3).xlsx]pins'!$AL$14:$AP$14</c15:sqref>
@@ -12994,7 +12986,7 @@
                 </c:marker>
                 <c:xVal>
                   <c:numRef>
-                    <c:extLst xmlns:c15="http://schemas.microsoft.com/office/drawing/2012/chart" xmlns:c16r2="http://schemas.microsoft.com/office/drawing/2015/06/chart">
+                    <c:extLst xmlns:c16r2="http://schemas.microsoft.com/office/drawing/2015/06/chart" xmlns:c15="http://schemas.microsoft.com/office/drawing/2012/chart">
                       <c:ext xmlns:c15="http://schemas.microsoft.com/office/drawing/2012/chart" uri="{02D57815-91ED-43cb-92C2-25804820EDAC}">
                         <c15:formulaRef>
                           <c15:sqref>'[Analytical temp (3).xlsx]pins'!$W$11:$AA$11</c15:sqref>
@@ -13024,7 +13016,7 @@
                 </c:xVal>
                 <c:yVal>
                   <c:numRef>
-                    <c:extLst xmlns:c15="http://schemas.microsoft.com/office/drawing/2012/chart" xmlns:c16r2="http://schemas.microsoft.com/office/drawing/2015/06/chart">
+                    <c:extLst xmlns:c16r2="http://schemas.microsoft.com/office/drawing/2015/06/chart" xmlns:c15="http://schemas.microsoft.com/office/drawing/2012/chart">
                       <c:ext xmlns:c15="http://schemas.microsoft.com/office/drawing/2012/chart" uri="{02D57815-91ED-43cb-92C2-25804820EDAC}">
                         <c15:formulaRef>
                           <c15:sqref>'[Analytical temp (3).xlsx]pins'!$AL$15:$AP$15</c15:sqref>
@@ -13094,7 +13086,7 @@
                 </c:marker>
                 <c:xVal>
                   <c:numRef>
-                    <c:extLst xmlns:c15="http://schemas.microsoft.com/office/drawing/2012/chart" xmlns:c16r2="http://schemas.microsoft.com/office/drawing/2015/06/chart">
+                    <c:extLst xmlns:c16r2="http://schemas.microsoft.com/office/drawing/2015/06/chart" xmlns:c15="http://schemas.microsoft.com/office/drawing/2012/chart">
                       <c:ext xmlns:c15="http://schemas.microsoft.com/office/drawing/2012/chart" uri="{02D57815-91ED-43cb-92C2-25804820EDAC}">
                         <c15:formulaRef>
                           <c15:sqref>'[Analytical temp (3).xlsx]pins'!$W$11:$AA$11</c15:sqref>
@@ -13124,7 +13116,7 @@
                 </c:xVal>
                 <c:yVal>
                   <c:numRef>
-                    <c:extLst xmlns:c15="http://schemas.microsoft.com/office/drawing/2012/chart" xmlns:c16r2="http://schemas.microsoft.com/office/drawing/2015/06/chart">
+                    <c:extLst xmlns:c16r2="http://schemas.microsoft.com/office/drawing/2015/06/chart" xmlns:c15="http://schemas.microsoft.com/office/drawing/2012/chart">
                       <c:ext xmlns:c15="http://schemas.microsoft.com/office/drawing/2012/chart" uri="{02D57815-91ED-43cb-92C2-25804820EDAC}">
                         <c15:formulaRef>
                           <c15:sqref>'[Analytical temp (3).xlsx]pins'!$AL$16:$AP$16</c15:sqref>
@@ -13159,7 +13151,7 @@
         </c:extLst>
       </c:scatterChart>
       <c:valAx>
-        <c:axId val="181077232"/>
+        <c:axId val="199266256"/>
         <c:scaling>
           <c:orientation val="minMax"/>
         </c:scaling>
@@ -13205,7 +13197,6 @@
               </a:p>
             </c:rich>
           </c:tx>
-          <c:layout/>
           <c:overlay val="0"/>
           <c:spPr>
             <a:noFill/>
@@ -13272,12 +13263,12 @@
             <a:endParaRPr lang="en-US"/>
           </a:p>
         </c:txPr>
-        <c:crossAx val="181077792"/>
+        <c:crossAx val="199266816"/>
         <c:crosses val="autoZero"/>
         <c:crossBetween val="midCat"/>
       </c:valAx>
       <c:valAx>
-        <c:axId val="181077792"/>
+        <c:axId val="199266816"/>
         <c:scaling>
           <c:orientation val="minMax"/>
         </c:scaling>
@@ -13323,7 +13314,6 @@
               </a:p>
             </c:rich>
           </c:tx>
-          <c:layout/>
           <c:overlay val="0"/>
           <c:spPr>
             <a:noFill/>
@@ -13390,7 +13380,7 @@
             <a:endParaRPr lang="en-US"/>
           </a:p>
         </c:txPr>
-        <c:crossAx val="181077232"/>
+        <c:crossAx val="199266256"/>
         <c:crosses val="autoZero"/>
         <c:crossBetween val="midCat"/>
       </c:valAx>
@@ -13669,8 +13659,8 @@
           <c:showPercent val="0"/>
           <c:showBubbleSize val="0"/>
         </c:dLbls>
-        <c:axId val="532109744"/>
-        <c:axId val="532110304"/>
+        <c:axId val="199315344"/>
+        <c:axId val="199315904"/>
         <c:extLst xmlns:c16r2="http://schemas.microsoft.com/office/drawing/2015/06/chart">
           <c:ext xmlns:c15="http://schemas.microsoft.com/office/drawing/2012/chart" uri="{02D57815-91ED-43cb-92C2-25804820EDAC}">
             <c15:filteredScatterSeries>
@@ -13805,7 +13795,7 @@
                 </c:marker>
                 <c:xVal>
                   <c:numRef>
-                    <c:extLst xmlns:c15="http://schemas.microsoft.com/office/drawing/2012/chart" xmlns:c16r2="http://schemas.microsoft.com/office/drawing/2015/06/chart">
+                    <c:extLst xmlns:c16r2="http://schemas.microsoft.com/office/drawing/2015/06/chart" xmlns:c15="http://schemas.microsoft.com/office/drawing/2012/chart">
                       <c:ext xmlns:c15="http://schemas.microsoft.com/office/drawing/2012/chart" uri="{02D57815-91ED-43cb-92C2-25804820EDAC}">
                         <c15:formulaRef>
                           <c15:sqref>'[Analytical temp (3).xlsx]pins'!$W$11:$AA$11</c15:sqref>
@@ -13835,7 +13825,7 @@
                 </c:xVal>
                 <c:yVal>
                   <c:numRef>
-                    <c:extLst xmlns:c15="http://schemas.microsoft.com/office/drawing/2012/chart" xmlns:c16r2="http://schemas.microsoft.com/office/drawing/2015/06/chart">
+                    <c:extLst xmlns:c16r2="http://schemas.microsoft.com/office/drawing/2015/06/chart" xmlns:c15="http://schemas.microsoft.com/office/drawing/2012/chart">
                       <c:ext xmlns:c15="http://schemas.microsoft.com/office/drawing/2012/chart" uri="{02D57815-91ED-43cb-92C2-25804820EDAC}">
                         <c15:formulaRef>
                           <c15:sqref>'[Analytical temp (3).xlsx]pins'!$AF$15:$AJ$15</c15:sqref>
@@ -13864,7 +13854,7 @@
                   </c:numRef>
                 </c:yVal>
                 <c:smooth val="0"/>
-                <c:extLst xmlns:c16r2="http://schemas.microsoft.com/office/drawing/2015/06/chart" xmlns:c15="http://schemas.microsoft.com/office/drawing/2012/chart">
+                <c:extLst xmlns:c15="http://schemas.microsoft.com/office/drawing/2012/chart" xmlns:c16r2="http://schemas.microsoft.com/office/drawing/2015/06/chart">
                   <c:ext xmlns:c16="http://schemas.microsoft.com/office/drawing/2014/chart" uri="{C3380CC4-5D6E-409C-BE32-E72D297353CC}">
                     <c16:uniqueId val="{00000001-55F7-4BAC-9ED7-0A0DBC995522}"/>
                   </c:ext>
@@ -13904,7 +13894,7 @@
                 </c:marker>
                 <c:xVal>
                   <c:numRef>
-                    <c:extLst xmlns:c15="http://schemas.microsoft.com/office/drawing/2012/chart" xmlns:c16r2="http://schemas.microsoft.com/office/drawing/2015/06/chart">
+                    <c:extLst xmlns:c16r2="http://schemas.microsoft.com/office/drawing/2015/06/chart" xmlns:c15="http://schemas.microsoft.com/office/drawing/2012/chart">
                       <c:ext xmlns:c15="http://schemas.microsoft.com/office/drawing/2012/chart" uri="{02D57815-91ED-43cb-92C2-25804820EDAC}">
                         <c15:formulaRef>
                           <c15:sqref>'[Analytical temp (3).xlsx]pins'!$W$11:$AA$11</c15:sqref>
@@ -13934,7 +13924,7 @@
                 </c:xVal>
                 <c:yVal>
                   <c:numRef>
-                    <c:extLst xmlns:c15="http://schemas.microsoft.com/office/drawing/2012/chart" xmlns:c16r2="http://schemas.microsoft.com/office/drawing/2015/06/chart">
+                    <c:extLst xmlns:c16r2="http://schemas.microsoft.com/office/drawing/2015/06/chart" xmlns:c15="http://schemas.microsoft.com/office/drawing/2012/chart">
                       <c:ext xmlns:c15="http://schemas.microsoft.com/office/drawing/2012/chart" uri="{02D57815-91ED-43cb-92C2-25804820EDAC}">
                         <c15:formulaRef>
                           <c15:sqref>'[Analytical temp (3).xlsx]pins'!$AF$16:$AJ$16</c15:sqref>
@@ -13963,7 +13953,7 @@
                   </c:numRef>
                 </c:yVal>
                 <c:smooth val="0"/>
-                <c:extLst xmlns:c16r2="http://schemas.microsoft.com/office/drawing/2015/06/chart" xmlns:c15="http://schemas.microsoft.com/office/drawing/2012/chart">
+                <c:extLst xmlns:c15="http://schemas.microsoft.com/office/drawing/2012/chart" xmlns:c16r2="http://schemas.microsoft.com/office/drawing/2015/06/chart">
                   <c:ext xmlns:c16="http://schemas.microsoft.com/office/drawing/2014/chart" uri="{C3380CC4-5D6E-409C-BE32-E72D297353CC}">
                     <c16:uniqueId val="{00000002-55F7-4BAC-9ED7-0A0DBC995522}"/>
                   </c:ext>
@@ -14003,7 +13993,7 @@
                 </c:marker>
                 <c:xVal>
                   <c:numRef>
-                    <c:extLst xmlns:c15="http://schemas.microsoft.com/office/drawing/2012/chart" xmlns:c16r2="http://schemas.microsoft.com/office/drawing/2015/06/chart">
+                    <c:extLst xmlns:c16r2="http://schemas.microsoft.com/office/drawing/2015/06/chart" xmlns:c15="http://schemas.microsoft.com/office/drawing/2012/chart">
                       <c:ext xmlns:c15="http://schemas.microsoft.com/office/drawing/2012/chart" uri="{02D57815-91ED-43cb-92C2-25804820EDAC}">
                         <c15:formulaRef>
                           <c15:sqref>'[Analytical temp (3).xlsx]pins'!$W$11:$AA$11</c15:sqref>
@@ -14033,7 +14023,7 @@
                 </c:xVal>
                 <c:yVal>
                   <c:numRef>
-                    <c:extLst xmlns:c15="http://schemas.microsoft.com/office/drawing/2012/chart" xmlns:c16r2="http://schemas.microsoft.com/office/drawing/2015/06/chart">
+                    <c:extLst xmlns:c16r2="http://schemas.microsoft.com/office/drawing/2015/06/chart" xmlns:c15="http://schemas.microsoft.com/office/drawing/2012/chart">
                       <c:ext xmlns:c15="http://schemas.microsoft.com/office/drawing/2012/chart" uri="{02D57815-91ED-43cb-92C2-25804820EDAC}">
                         <c15:formulaRef>
                           <c15:sqref>'[Analytical temp (3).xlsx]pins'!$AL$14:$AP$14</c15:sqref>
@@ -14097,7 +14087,7 @@
                 </c:marker>
                 <c:xVal>
                   <c:numRef>
-                    <c:extLst xmlns:c15="http://schemas.microsoft.com/office/drawing/2012/chart" xmlns:c16r2="http://schemas.microsoft.com/office/drawing/2015/06/chart">
+                    <c:extLst xmlns:c16r2="http://schemas.microsoft.com/office/drawing/2015/06/chart" xmlns:c15="http://schemas.microsoft.com/office/drawing/2012/chart">
                       <c:ext xmlns:c15="http://schemas.microsoft.com/office/drawing/2012/chart" uri="{02D57815-91ED-43cb-92C2-25804820EDAC}">
                         <c15:formulaRef>
                           <c15:sqref>'[Analytical temp (3).xlsx]pins'!$W$11:$AA$11</c15:sqref>
@@ -14127,7 +14117,7 @@
                 </c:xVal>
                 <c:yVal>
                   <c:numRef>
-                    <c:extLst xmlns:c15="http://schemas.microsoft.com/office/drawing/2012/chart" xmlns:c16r2="http://schemas.microsoft.com/office/drawing/2015/06/chart">
+                    <c:extLst xmlns:c16r2="http://schemas.microsoft.com/office/drawing/2015/06/chart" xmlns:c15="http://schemas.microsoft.com/office/drawing/2012/chart">
                       <c:ext xmlns:c15="http://schemas.microsoft.com/office/drawing/2012/chart" uri="{02D57815-91ED-43cb-92C2-25804820EDAC}">
                         <c15:formulaRef>
                           <c15:sqref>'[Analytical temp (3).xlsx]pins'!$AL$15:$AP$15</c15:sqref>
@@ -14197,7 +14187,7 @@
                 </c:marker>
                 <c:xVal>
                   <c:numRef>
-                    <c:extLst xmlns:c15="http://schemas.microsoft.com/office/drawing/2012/chart" xmlns:c16r2="http://schemas.microsoft.com/office/drawing/2015/06/chart">
+                    <c:extLst xmlns:c16r2="http://schemas.microsoft.com/office/drawing/2015/06/chart" xmlns:c15="http://schemas.microsoft.com/office/drawing/2012/chart">
                       <c:ext xmlns:c15="http://schemas.microsoft.com/office/drawing/2012/chart" uri="{02D57815-91ED-43cb-92C2-25804820EDAC}">
                         <c15:formulaRef>
                           <c15:sqref>'[Analytical temp (3).xlsx]pins'!$W$11:$AA$11</c15:sqref>
@@ -14227,7 +14217,7 @@
                 </c:xVal>
                 <c:yVal>
                   <c:numRef>
-                    <c:extLst xmlns:c15="http://schemas.microsoft.com/office/drawing/2012/chart" xmlns:c16r2="http://schemas.microsoft.com/office/drawing/2015/06/chart">
+                    <c:extLst xmlns:c16r2="http://schemas.microsoft.com/office/drawing/2015/06/chart" xmlns:c15="http://schemas.microsoft.com/office/drawing/2012/chart">
                       <c:ext xmlns:c15="http://schemas.microsoft.com/office/drawing/2012/chart" uri="{02D57815-91ED-43cb-92C2-25804820EDAC}">
                         <c15:formulaRef>
                           <c15:sqref>'[Analytical temp (3).xlsx]pins'!$AL$16:$AP$16</c15:sqref>
@@ -14262,7 +14252,7 @@
         </c:extLst>
       </c:scatterChart>
       <c:valAx>
-        <c:axId val="532109744"/>
+        <c:axId val="199315344"/>
         <c:scaling>
           <c:orientation val="minMax"/>
         </c:scaling>
@@ -14308,7 +14298,6 @@
               </a:p>
             </c:rich>
           </c:tx>
-          <c:layout/>
           <c:overlay val="0"/>
           <c:spPr>
             <a:noFill/>
@@ -14375,12 +14364,12 @@
             <a:endParaRPr lang="en-US"/>
           </a:p>
         </c:txPr>
-        <c:crossAx val="532110304"/>
+        <c:crossAx val="199315904"/>
         <c:crosses val="autoZero"/>
         <c:crossBetween val="midCat"/>
       </c:valAx>
       <c:valAx>
-        <c:axId val="532110304"/>
+        <c:axId val="199315904"/>
         <c:scaling>
           <c:orientation val="minMax"/>
         </c:scaling>
@@ -14426,7 +14415,6 @@
               </a:p>
             </c:rich>
           </c:tx>
-          <c:layout/>
           <c:overlay val="0"/>
           <c:spPr>
             <a:noFill/>
@@ -14493,7 +14481,7 @@
             <a:endParaRPr lang="en-US"/>
           </a:p>
         </c:txPr>
-        <c:crossAx val="532109744"/>
+        <c:crossAx val="199315344"/>
         <c:crosses val="autoZero"/>
         <c:crossBetween val="midCat"/>
       </c:valAx>
@@ -14731,8 +14719,8 @@
           <c:showPercent val="0"/>
           <c:showBubbleSize val="0"/>
         </c:dLbls>
-        <c:axId val="527344960"/>
-        <c:axId val="527345520"/>
+        <c:axId val="199476016"/>
+        <c:axId val="199476576"/>
         <c:extLst xmlns:c16r2="http://schemas.microsoft.com/office/drawing/2015/06/chart">
           <c:ext xmlns:c15="http://schemas.microsoft.com/office/drawing/2012/chart" uri="{02D57815-91ED-43cb-92C2-25804820EDAC}">
             <c15:filteredScatterSeries>
@@ -14867,7 +14855,7 @@
                 </c:marker>
                 <c:xVal>
                   <c:numRef>
-                    <c:extLst xmlns:c15="http://schemas.microsoft.com/office/drawing/2012/chart" xmlns:c16r2="http://schemas.microsoft.com/office/drawing/2015/06/chart">
+                    <c:extLst xmlns:c16r2="http://schemas.microsoft.com/office/drawing/2015/06/chart" xmlns:c15="http://schemas.microsoft.com/office/drawing/2012/chart">
                       <c:ext xmlns:c15="http://schemas.microsoft.com/office/drawing/2012/chart" uri="{02D57815-91ED-43cb-92C2-25804820EDAC}">
                         <c15:formulaRef>
                           <c15:sqref>'[Analytical temp (3).xlsx]pins'!$W$11:$AA$11</c15:sqref>
@@ -14897,7 +14885,7 @@
                 </c:xVal>
                 <c:yVal>
                   <c:numRef>
-                    <c:extLst xmlns:c15="http://schemas.microsoft.com/office/drawing/2012/chart" xmlns:c16r2="http://schemas.microsoft.com/office/drawing/2015/06/chart">
+                    <c:extLst xmlns:c16r2="http://schemas.microsoft.com/office/drawing/2015/06/chart" xmlns:c15="http://schemas.microsoft.com/office/drawing/2012/chart">
                       <c:ext xmlns:c15="http://schemas.microsoft.com/office/drawing/2012/chart" uri="{02D57815-91ED-43cb-92C2-25804820EDAC}">
                         <c15:formulaRef>
                           <c15:sqref>'[Analytical temp (3).xlsx]pins'!$AF$15:$AJ$15</c15:sqref>
@@ -14926,7 +14914,7 @@
                   </c:numRef>
                 </c:yVal>
                 <c:smooth val="0"/>
-                <c:extLst xmlns:c16r2="http://schemas.microsoft.com/office/drawing/2015/06/chart" xmlns:c15="http://schemas.microsoft.com/office/drawing/2012/chart">
+                <c:extLst xmlns:c15="http://schemas.microsoft.com/office/drawing/2012/chart" xmlns:c16r2="http://schemas.microsoft.com/office/drawing/2015/06/chart">
                   <c:ext xmlns:c16="http://schemas.microsoft.com/office/drawing/2014/chart" uri="{C3380CC4-5D6E-409C-BE32-E72D297353CC}">
                     <c16:uniqueId val="{00000001-55F7-4BAC-9ED7-0A0DBC995522}"/>
                   </c:ext>
@@ -14966,7 +14954,7 @@
                 </c:marker>
                 <c:xVal>
                   <c:numRef>
-                    <c:extLst xmlns:c15="http://schemas.microsoft.com/office/drawing/2012/chart" xmlns:c16r2="http://schemas.microsoft.com/office/drawing/2015/06/chart">
+                    <c:extLst xmlns:c16r2="http://schemas.microsoft.com/office/drawing/2015/06/chart" xmlns:c15="http://schemas.microsoft.com/office/drawing/2012/chart">
                       <c:ext xmlns:c15="http://schemas.microsoft.com/office/drawing/2012/chart" uri="{02D57815-91ED-43cb-92C2-25804820EDAC}">
                         <c15:formulaRef>
                           <c15:sqref>'[Analytical temp (3).xlsx]pins'!$W$11:$AA$11</c15:sqref>
@@ -14996,7 +14984,7 @@
                 </c:xVal>
                 <c:yVal>
                   <c:numRef>
-                    <c:extLst xmlns:c15="http://schemas.microsoft.com/office/drawing/2012/chart" xmlns:c16r2="http://schemas.microsoft.com/office/drawing/2015/06/chart">
+                    <c:extLst xmlns:c16r2="http://schemas.microsoft.com/office/drawing/2015/06/chart" xmlns:c15="http://schemas.microsoft.com/office/drawing/2012/chart">
                       <c:ext xmlns:c15="http://schemas.microsoft.com/office/drawing/2012/chart" uri="{02D57815-91ED-43cb-92C2-25804820EDAC}">
                         <c15:formulaRef>
                           <c15:sqref>'[Analytical temp (3).xlsx]pins'!$AF$16:$AJ$16</c15:sqref>
@@ -15025,7 +15013,7 @@
                   </c:numRef>
                 </c:yVal>
                 <c:smooth val="0"/>
-                <c:extLst xmlns:c16r2="http://schemas.microsoft.com/office/drawing/2015/06/chart" xmlns:c15="http://schemas.microsoft.com/office/drawing/2012/chart">
+                <c:extLst xmlns:c15="http://schemas.microsoft.com/office/drawing/2012/chart" xmlns:c16r2="http://schemas.microsoft.com/office/drawing/2015/06/chart">
                   <c:ext xmlns:c16="http://schemas.microsoft.com/office/drawing/2014/chart" uri="{C3380CC4-5D6E-409C-BE32-E72D297353CC}">
                     <c16:uniqueId val="{00000002-55F7-4BAC-9ED7-0A0DBC995522}"/>
                   </c:ext>
@@ -15065,7 +15053,7 @@
                 </c:marker>
                 <c:xVal>
                   <c:numRef>
-                    <c:extLst xmlns:c15="http://schemas.microsoft.com/office/drawing/2012/chart" xmlns:c16r2="http://schemas.microsoft.com/office/drawing/2015/06/chart">
+                    <c:extLst xmlns:c16r2="http://schemas.microsoft.com/office/drawing/2015/06/chart" xmlns:c15="http://schemas.microsoft.com/office/drawing/2012/chart">
                       <c:ext xmlns:c15="http://schemas.microsoft.com/office/drawing/2012/chart" uri="{02D57815-91ED-43cb-92C2-25804820EDAC}">
                         <c15:formulaRef>
                           <c15:sqref>'[Analytical temp (3).xlsx]pins'!$W$11:$AA$11</c15:sqref>
@@ -15095,7 +15083,7 @@
                 </c:xVal>
                 <c:yVal>
                   <c:numRef>
-                    <c:extLst xmlns:c15="http://schemas.microsoft.com/office/drawing/2012/chart" xmlns:c16r2="http://schemas.microsoft.com/office/drawing/2015/06/chart">
+                    <c:extLst xmlns:c16r2="http://schemas.microsoft.com/office/drawing/2015/06/chart" xmlns:c15="http://schemas.microsoft.com/office/drawing/2012/chart">
                       <c:ext xmlns:c15="http://schemas.microsoft.com/office/drawing/2012/chart" uri="{02D57815-91ED-43cb-92C2-25804820EDAC}">
                         <c15:formulaRef>
                           <c15:sqref>'[Analytical temp (3).xlsx]pins'!$AL$14:$AP$14</c15:sqref>
@@ -15159,7 +15147,7 @@
                 </c:marker>
                 <c:xVal>
                   <c:numRef>
-                    <c:extLst xmlns:c15="http://schemas.microsoft.com/office/drawing/2012/chart" xmlns:c16r2="http://schemas.microsoft.com/office/drawing/2015/06/chart">
+                    <c:extLst xmlns:c16r2="http://schemas.microsoft.com/office/drawing/2015/06/chart" xmlns:c15="http://schemas.microsoft.com/office/drawing/2012/chart">
                       <c:ext xmlns:c15="http://schemas.microsoft.com/office/drawing/2012/chart" uri="{02D57815-91ED-43cb-92C2-25804820EDAC}">
                         <c15:formulaRef>
                           <c15:sqref>'[Analytical temp (3).xlsx]pins'!$W$11:$AA$11</c15:sqref>
@@ -15189,7 +15177,7 @@
                 </c:xVal>
                 <c:yVal>
                   <c:numRef>
-                    <c:extLst xmlns:c15="http://schemas.microsoft.com/office/drawing/2012/chart" xmlns:c16r2="http://schemas.microsoft.com/office/drawing/2015/06/chart">
+                    <c:extLst xmlns:c16r2="http://schemas.microsoft.com/office/drawing/2015/06/chart" xmlns:c15="http://schemas.microsoft.com/office/drawing/2012/chart">
                       <c:ext xmlns:c15="http://schemas.microsoft.com/office/drawing/2012/chart" uri="{02D57815-91ED-43cb-92C2-25804820EDAC}">
                         <c15:formulaRef>
                           <c15:sqref>'[Analytical temp (3).xlsx]pins'!$AL$15:$AP$15</c15:sqref>
@@ -15259,7 +15247,7 @@
                 </c:marker>
                 <c:xVal>
                   <c:numRef>
-                    <c:extLst xmlns:c15="http://schemas.microsoft.com/office/drawing/2012/chart" xmlns:c16r2="http://schemas.microsoft.com/office/drawing/2015/06/chart">
+                    <c:extLst xmlns:c16r2="http://schemas.microsoft.com/office/drawing/2015/06/chart" xmlns:c15="http://schemas.microsoft.com/office/drawing/2012/chart">
                       <c:ext xmlns:c15="http://schemas.microsoft.com/office/drawing/2012/chart" uri="{02D57815-91ED-43cb-92C2-25804820EDAC}">
                         <c15:formulaRef>
                           <c15:sqref>'[Analytical temp (3).xlsx]pins'!$W$11:$AA$11</c15:sqref>
@@ -15289,7 +15277,7 @@
                 </c:xVal>
                 <c:yVal>
                   <c:numRef>
-                    <c:extLst xmlns:c15="http://schemas.microsoft.com/office/drawing/2012/chart" xmlns:c16r2="http://schemas.microsoft.com/office/drawing/2015/06/chart">
+                    <c:extLst xmlns:c16r2="http://schemas.microsoft.com/office/drawing/2015/06/chart" xmlns:c15="http://schemas.microsoft.com/office/drawing/2012/chart">
                       <c:ext xmlns:c15="http://schemas.microsoft.com/office/drawing/2012/chart" uri="{02D57815-91ED-43cb-92C2-25804820EDAC}">
                         <c15:formulaRef>
                           <c15:sqref>'[Analytical temp (3).xlsx]pins'!$AL$16:$AP$16</c15:sqref>
@@ -15324,7 +15312,7 @@
         </c:extLst>
       </c:scatterChart>
       <c:valAx>
-        <c:axId val="527344960"/>
+        <c:axId val="199476016"/>
         <c:scaling>
           <c:orientation val="minMax"/>
         </c:scaling>
@@ -15370,7 +15358,6 @@
               </a:p>
             </c:rich>
           </c:tx>
-          <c:layout/>
           <c:overlay val="0"/>
           <c:spPr>
             <a:noFill/>
@@ -15437,12 +15424,12 @@
             <a:endParaRPr lang="en-US"/>
           </a:p>
         </c:txPr>
-        <c:crossAx val="527345520"/>
+        <c:crossAx val="199476576"/>
         <c:crosses val="autoZero"/>
         <c:crossBetween val="midCat"/>
       </c:valAx>
       <c:valAx>
-        <c:axId val="527345520"/>
+        <c:axId val="199476576"/>
         <c:scaling>
           <c:orientation val="minMax"/>
         </c:scaling>
@@ -15488,7 +15475,6 @@
               </a:p>
             </c:rich>
           </c:tx>
-          <c:layout/>
           <c:overlay val="0"/>
           <c:spPr>
             <a:noFill/>
@@ -15555,7 +15541,7 @@
             <a:endParaRPr lang="en-US"/>
           </a:p>
         </c:txPr>
-        <c:crossAx val="527344960"/>
+        <c:crossAx val="199476016"/>
         <c:crosses val="autoZero"/>
         <c:crossBetween val="midCat"/>
       </c:valAx>
@@ -15793,8 +15779,8 @@
           <c:showPercent val="0"/>
           <c:showBubbleSize val="0"/>
         </c:dLbls>
-        <c:axId val="419623152"/>
-        <c:axId val="419623712"/>
+        <c:axId val="199930768"/>
+        <c:axId val="199931328"/>
         <c:extLst xmlns:c16r2="http://schemas.microsoft.com/office/drawing/2015/06/chart">
           <c:ext xmlns:c15="http://schemas.microsoft.com/office/drawing/2012/chart" uri="{02D57815-91ED-43cb-92C2-25804820EDAC}">
             <c15:filteredScatterSeries>
@@ -15929,7 +15915,7 @@
                 </c:marker>
                 <c:xVal>
                   <c:numRef>
-                    <c:extLst xmlns:c15="http://schemas.microsoft.com/office/drawing/2012/chart" xmlns:c16r2="http://schemas.microsoft.com/office/drawing/2015/06/chart">
+                    <c:extLst xmlns:c16r2="http://schemas.microsoft.com/office/drawing/2015/06/chart" xmlns:c15="http://schemas.microsoft.com/office/drawing/2012/chart">
                       <c:ext xmlns:c15="http://schemas.microsoft.com/office/drawing/2012/chart" uri="{02D57815-91ED-43cb-92C2-25804820EDAC}">
                         <c15:formulaRef>
                           <c15:sqref>'[Analytical temp (3).xlsx]pins'!$W$11:$AA$11</c15:sqref>
@@ -15959,7 +15945,7 @@
                 </c:xVal>
                 <c:yVal>
                   <c:numRef>
-                    <c:extLst xmlns:c15="http://schemas.microsoft.com/office/drawing/2012/chart" xmlns:c16r2="http://schemas.microsoft.com/office/drawing/2015/06/chart">
+                    <c:extLst xmlns:c16r2="http://schemas.microsoft.com/office/drawing/2015/06/chart" xmlns:c15="http://schemas.microsoft.com/office/drawing/2012/chart">
                       <c:ext xmlns:c15="http://schemas.microsoft.com/office/drawing/2012/chart" uri="{02D57815-91ED-43cb-92C2-25804820EDAC}">
                         <c15:formulaRef>
                           <c15:sqref>'[Analytical temp (3).xlsx]pins'!$AF$15:$AJ$15</c15:sqref>
@@ -15988,7 +15974,7 @@
                   </c:numRef>
                 </c:yVal>
                 <c:smooth val="0"/>
-                <c:extLst xmlns:c16r2="http://schemas.microsoft.com/office/drawing/2015/06/chart" xmlns:c15="http://schemas.microsoft.com/office/drawing/2012/chart">
+                <c:extLst xmlns:c15="http://schemas.microsoft.com/office/drawing/2012/chart" xmlns:c16r2="http://schemas.microsoft.com/office/drawing/2015/06/chart">
                   <c:ext xmlns:c16="http://schemas.microsoft.com/office/drawing/2014/chart" uri="{C3380CC4-5D6E-409C-BE32-E72D297353CC}">
                     <c16:uniqueId val="{00000001-55F7-4BAC-9ED7-0A0DBC995522}"/>
                   </c:ext>
@@ -16028,7 +16014,7 @@
                 </c:marker>
                 <c:xVal>
                   <c:numRef>
-                    <c:extLst xmlns:c15="http://schemas.microsoft.com/office/drawing/2012/chart" xmlns:c16r2="http://schemas.microsoft.com/office/drawing/2015/06/chart">
+                    <c:extLst xmlns:c16r2="http://schemas.microsoft.com/office/drawing/2015/06/chart" xmlns:c15="http://schemas.microsoft.com/office/drawing/2012/chart">
                       <c:ext xmlns:c15="http://schemas.microsoft.com/office/drawing/2012/chart" uri="{02D57815-91ED-43cb-92C2-25804820EDAC}">
                         <c15:formulaRef>
                           <c15:sqref>'[Analytical temp (3).xlsx]pins'!$W$11:$AA$11</c15:sqref>
@@ -16058,7 +16044,7 @@
                 </c:xVal>
                 <c:yVal>
                   <c:numRef>
-                    <c:extLst xmlns:c15="http://schemas.microsoft.com/office/drawing/2012/chart" xmlns:c16r2="http://schemas.microsoft.com/office/drawing/2015/06/chart">
+                    <c:extLst xmlns:c16r2="http://schemas.microsoft.com/office/drawing/2015/06/chart" xmlns:c15="http://schemas.microsoft.com/office/drawing/2012/chart">
                       <c:ext xmlns:c15="http://schemas.microsoft.com/office/drawing/2012/chart" uri="{02D57815-91ED-43cb-92C2-25804820EDAC}">
                         <c15:formulaRef>
                           <c15:sqref>'[Analytical temp (3).xlsx]pins'!$AF$16:$AJ$16</c15:sqref>
@@ -16087,7 +16073,7 @@
                   </c:numRef>
                 </c:yVal>
                 <c:smooth val="0"/>
-                <c:extLst xmlns:c16r2="http://schemas.microsoft.com/office/drawing/2015/06/chart" xmlns:c15="http://schemas.microsoft.com/office/drawing/2012/chart">
+                <c:extLst xmlns:c15="http://schemas.microsoft.com/office/drawing/2012/chart" xmlns:c16r2="http://schemas.microsoft.com/office/drawing/2015/06/chart">
                   <c:ext xmlns:c16="http://schemas.microsoft.com/office/drawing/2014/chart" uri="{C3380CC4-5D6E-409C-BE32-E72D297353CC}">
                     <c16:uniqueId val="{00000002-55F7-4BAC-9ED7-0A0DBC995522}"/>
                   </c:ext>
@@ -16127,7 +16113,7 @@
                 </c:marker>
                 <c:xVal>
                   <c:numRef>
-                    <c:extLst xmlns:c15="http://schemas.microsoft.com/office/drawing/2012/chart" xmlns:c16r2="http://schemas.microsoft.com/office/drawing/2015/06/chart">
+                    <c:extLst xmlns:c16r2="http://schemas.microsoft.com/office/drawing/2015/06/chart" xmlns:c15="http://schemas.microsoft.com/office/drawing/2012/chart">
                       <c:ext xmlns:c15="http://schemas.microsoft.com/office/drawing/2012/chart" uri="{02D57815-91ED-43cb-92C2-25804820EDAC}">
                         <c15:formulaRef>
                           <c15:sqref>'[Analytical temp (3).xlsx]pins'!$W$11:$AA$11</c15:sqref>
@@ -16157,7 +16143,7 @@
                 </c:xVal>
                 <c:yVal>
                   <c:numRef>
-                    <c:extLst xmlns:c15="http://schemas.microsoft.com/office/drawing/2012/chart" xmlns:c16r2="http://schemas.microsoft.com/office/drawing/2015/06/chart">
+                    <c:extLst xmlns:c16r2="http://schemas.microsoft.com/office/drawing/2015/06/chart" xmlns:c15="http://schemas.microsoft.com/office/drawing/2012/chart">
                       <c:ext xmlns:c15="http://schemas.microsoft.com/office/drawing/2012/chart" uri="{02D57815-91ED-43cb-92C2-25804820EDAC}">
                         <c15:formulaRef>
                           <c15:sqref>'[Analytical temp (3).xlsx]pins'!$AL$14:$AP$14</c15:sqref>
@@ -16221,7 +16207,7 @@
                 </c:marker>
                 <c:xVal>
                   <c:numRef>
-                    <c:extLst xmlns:c15="http://schemas.microsoft.com/office/drawing/2012/chart" xmlns:c16r2="http://schemas.microsoft.com/office/drawing/2015/06/chart">
+                    <c:extLst xmlns:c16r2="http://schemas.microsoft.com/office/drawing/2015/06/chart" xmlns:c15="http://schemas.microsoft.com/office/drawing/2012/chart">
                       <c:ext xmlns:c15="http://schemas.microsoft.com/office/drawing/2012/chart" uri="{02D57815-91ED-43cb-92C2-25804820EDAC}">
                         <c15:formulaRef>
                           <c15:sqref>'[Analytical temp (3).xlsx]pins'!$W$11:$AA$11</c15:sqref>
@@ -16251,7 +16237,7 @@
                 </c:xVal>
                 <c:yVal>
                   <c:numRef>
-                    <c:extLst xmlns:c15="http://schemas.microsoft.com/office/drawing/2012/chart" xmlns:c16r2="http://schemas.microsoft.com/office/drawing/2015/06/chart">
+                    <c:extLst xmlns:c16r2="http://schemas.microsoft.com/office/drawing/2015/06/chart" xmlns:c15="http://schemas.microsoft.com/office/drawing/2012/chart">
                       <c:ext xmlns:c15="http://schemas.microsoft.com/office/drawing/2012/chart" uri="{02D57815-91ED-43cb-92C2-25804820EDAC}">
                         <c15:formulaRef>
                           <c15:sqref>'[Analytical temp (3).xlsx]pins'!$AL$15:$AP$15</c15:sqref>
@@ -16321,7 +16307,7 @@
                 </c:marker>
                 <c:xVal>
                   <c:numRef>
-                    <c:extLst xmlns:c15="http://schemas.microsoft.com/office/drawing/2012/chart" xmlns:c16r2="http://schemas.microsoft.com/office/drawing/2015/06/chart">
+                    <c:extLst xmlns:c16r2="http://schemas.microsoft.com/office/drawing/2015/06/chart" xmlns:c15="http://schemas.microsoft.com/office/drawing/2012/chart">
                       <c:ext xmlns:c15="http://schemas.microsoft.com/office/drawing/2012/chart" uri="{02D57815-91ED-43cb-92C2-25804820EDAC}">
                         <c15:formulaRef>
                           <c15:sqref>'[Analytical temp (3).xlsx]pins'!$W$11:$AA$11</c15:sqref>
@@ -16351,7 +16337,7 @@
                 </c:xVal>
                 <c:yVal>
                   <c:numRef>
-                    <c:extLst xmlns:c15="http://schemas.microsoft.com/office/drawing/2012/chart" xmlns:c16r2="http://schemas.microsoft.com/office/drawing/2015/06/chart">
+                    <c:extLst xmlns:c16r2="http://schemas.microsoft.com/office/drawing/2015/06/chart" xmlns:c15="http://schemas.microsoft.com/office/drawing/2012/chart">
                       <c:ext xmlns:c15="http://schemas.microsoft.com/office/drawing/2012/chart" uri="{02D57815-91ED-43cb-92C2-25804820EDAC}">
                         <c15:formulaRef>
                           <c15:sqref>'[Analytical temp (3).xlsx]pins'!$AL$16:$AP$16</c15:sqref>
@@ -16386,7 +16372,7 @@
         </c:extLst>
       </c:scatterChart>
       <c:valAx>
-        <c:axId val="419623152"/>
+        <c:axId val="199930768"/>
         <c:scaling>
           <c:orientation val="minMax"/>
         </c:scaling>
@@ -16432,7 +16418,6 @@
               </a:p>
             </c:rich>
           </c:tx>
-          <c:layout/>
           <c:overlay val="0"/>
           <c:spPr>
             <a:noFill/>
@@ -16499,12 +16484,12 @@
             <a:endParaRPr lang="en-US"/>
           </a:p>
         </c:txPr>
-        <c:crossAx val="419623712"/>
+        <c:crossAx val="199931328"/>
         <c:crosses val="autoZero"/>
         <c:crossBetween val="midCat"/>
       </c:valAx>
       <c:valAx>
-        <c:axId val="419623712"/>
+        <c:axId val="199931328"/>
         <c:scaling>
           <c:orientation val="minMax"/>
         </c:scaling>
@@ -16550,7 +16535,6 @@
               </a:p>
             </c:rich>
           </c:tx>
-          <c:layout/>
           <c:overlay val="0"/>
           <c:spPr>
             <a:noFill/>
@@ -16617,7 +16601,7 @@
             <a:endParaRPr lang="en-US"/>
           </a:p>
         </c:txPr>
-        <c:crossAx val="419623152"/>
+        <c:crossAx val="199930768"/>
         <c:crosses val="autoZero"/>
         <c:crossBetween val="midCat"/>
       </c:valAx>
@@ -17024,8 +17008,8 @@
           <c:showPercent val="0"/>
           <c:showBubbleSize val="0"/>
         </c:dLbls>
-        <c:axId val="419628192"/>
-        <c:axId val="419628752"/>
+        <c:axId val="199935808"/>
+        <c:axId val="199936368"/>
         <c:extLst xmlns:c16r2="http://schemas.microsoft.com/office/drawing/2015/06/chart">
           <c:ext xmlns:c15="http://schemas.microsoft.com/office/drawing/2012/chart" uri="{02D57815-91ED-43cb-92C2-25804820EDAC}">
             <c15:filteredScatterSeries>
@@ -17131,7 +17115,7 @@
         </c:extLst>
       </c:scatterChart>
       <c:valAx>
-        <c:axId val="419628192"/>
+        <c:axId val="199935808"/>
         <c:scaling>
           <c:orientation val="minMax"/>
         </c:scaling>
@@ -17188,12 +17172,12 @@
             <a:endParaRPr lang="en-US"/>
           </a:p>
         </c:txPr>
-        <c:crossAx val="419628752"/>
+        <c:crossAx val="199936368"/>
         <c:crosses val="autoZero"/>
         <c:crossBetween val="midCat"/>
       </c:valAx>
       <c:valAx>
-        <c:axId val="419628752"/>
+        <c:axId val="199936368"/>
         <c:scaling>
           <c:orientation val="minMax"/>
           <c:min val="0"/>
@@ -17251,7 +17235,7 @@
             <a:endParaRPr lang="en-US"/>
           </a:p>
         </c:txPr>
-        <c:crossAx val="419628192"/>
+        <c:crossAx val="199935808"/>
         <c:crosses val="autoZero"/>
         <c:crossBetween val="midCat"/>
       </c:valAx>
@@ -27030,14 +27014,14 @@
           <a:effectLst/>
           <a:extLst>
             <a:ext uri="{909E8E84-426E-40dd-AFC4-6F175D3DCCD1}">
-              <a14:hiddenFill xmlns:a14="http://schemas.microsoft.com/office/drawing/2010/main" xmlns="">
+              <a14:hiddenFill xmlns="" xmlns:a14="http://schemas.microsoft.com/office/drawing/2010/main">
                 <a:solidFill>
                   <a:schemeClr val="accent1"/>
                 </a:solidFill>
               </a14:hiddenFill>
             </a:ext>
             <a:ext uri="{91240B29-F687-4f45-9708-019B960494DF}">
-              <a14:hiddenLine xmlns:a14="http://schemas.microsoft.com/office/drawing/2010/main" xmlns="" w="9525">
+              <a14:hiddenLine xmlns="" xmlns:a14="http://schemas.microsoft.com/office/drawing/2010/main" w="9525">
                 <a:solidFill>
                   <a:schemeClr val="tx1"/>
                 </a:solidFill>
@@ -27047,7 +27031,7 @@
               </a14:hiddenLine>
             </a:ext>
             <a:ext uri="{AF507438-7753-43e0-B8FC-AC1667EBCBE1}">
-              <a14:hiddenEffects xmlns:a14="http://schemas.microsoft.com/office/drawing/2010/main" xmlns="">
+              <a14:hiddenEffects xmlns="" xmlns:a14="http://schemas.microsoft.com/office/drawing/2010/main">
                 <a:effectLst>
                   <a:outerShdw dist="35921" dir="2700000" algn="ctr" rotWithShape="0">
                     <a:schemeClr val="bg2"/>
@@ -27605,71 +27589,7 @@
                 </a:effectLst>
                 <a:latin typeface="Verdana" pitchFamily="34" charset="0"/>
               </a:rPr>
-              <a:t>Depleted Uranium Soaring Temperature </a:t>
-            </a:r>
-            <a:r>
-              <a:rPr lang="en-US" sz="2400" b="1" dirty="0" smtClean="0">
-                <a:solidFill>
-                  <a:srgbClr val="808080">
-                    <a:lumMod val="50000"/>
-                  </a:srgbClr>
-                </a:solidFill>
-                <a:effectLst>
-                  <a:outerShdw blurRad="38100" dist="38100" dir="2700000" algn="tl">
-                    <a:srgbClr val="C0C0C0"/>
-                  </a:outerShdw>
-                </a:effectLst>
-                <a:latin typeface="Verdana" pitchFamily="34" charset="0"/>
-              </a:rPr>
-              <a:t>Reactor </a:t>
-            </a:r>
-            <a:r>
-              <a:rPr lang="en-US" sz="2400" b="1" dirty="0" smtClean="0">
-                <a:solidFill>
-                  <a:srgbClr val="808080">
-                    <a:lumMod val="50000"/>
-                  </a:srgbClr>
-                </a:solidFill>
-                <a:effectLst>
-                  <a:outerShdw blurRad="38100" dist="38100" dir="2700000" algn="tl">
-                    <a:srgbClr val="C0C0C0"/>
-                  </a:outerShdw>
-                </a:effectLst>
-                <a:latin typeface="Verdana" pitchFamily="34" charset="0"/>
-              </a:rPr>
-              <a:t>(</a:t>
-            </a:r>
-            <a:r>
-              <a:rPr lang="en-US" sz="2400" b="1" dirty="0" smtClean="0">
-                <a:solidFill>
-                  <a:srgbClr val="808080">
-                    <a:lumMod val="50000"/>
-                  </a:srgbClr>
-                </a:solidFill>
-                <a:effectLst>
-                  <a:outerShdw blurRad="38100" dist="38100" dir="2700000" algn="tl">
-                    <a:srgbClr val="C0C0C0"/>
-                  </a:outerShdw>
-                </a:effectLst>
-                <a:latin typeface="Verdana" pitchFamily="34" charset="0"/>
-              </a:rPr>
-              <a:t>DUSTR</a:t>
-            </a:r>
-            <a:r>
-              <a:rPr lang="en-US" sz="2400" b="1" dirty="0" smtClean="0">
-                <a:solidFill>
-                  <a:srgbClr val="808080">
-                    <a:lumMod val="50000"/>
-                  </a:srgbClr>
-                </a:solidFill>
-                <a:effectLst>
-                  <a:outerShdw blurRad="38100" dist="38100" dir="2700000" algn="tl">
-                    <a:srgbClr val="C0C0C0"/>
-                  </a:outerShdw>
-                </a:effectLst>
-                <a:latin typeface="Verdana" pitchFamily="34" charset="0"/>
-              </a:rPr>
-              <a:t>)</a:t>
+              <a:t>Depleted Uranium Soaring Temperature Reactor (DUSTR)</a:t>
             </a:r>
             <a:endParaRPr lang="en-US" sz="2400" b="1" dirty="0">
               <a:solidFill>
@@ -28017,7 +27937,7 @@
           <a:noFill/>
           <a:extLst>
             <a:ext uri="{909E8E84-426E-40dd-AFC4-6F175D3DCCD1}">
-              <a14:hiddenFill xmlns:a14="http://schemas.microsoft.com/office/drawing/2010/main" xmlns="">
+              <a14:hiddenFill xmlns="" xmlns:a14="http://schemas.microsoft.com/office/drawing/2010/main">
                 <a:solidFill>
                   <a:srgbClr val="FFFFFF"/>
                 </a:solidFill>
@@ -29142,7 +29062,7 @@
           <p:cNvPr id="4" name="Chart 3">
             <a:extLst>
               <a:ext uri="{FF2B5EF4-FFF2-40B4-BE49-F238E27FC236}">
-                <a16:creationId xmlns:lc="http://schemas.openxmlformats.org/drawingml/2006/lockedCanvas" xmlns="" xmlns:a16="http://schemas.microsoft.com/office/drawing/2014/main" xmlns:xdr="http://schemas.openxmlformats.org/drawingml/2006/spreadsheetDrawing" id="{00000000-0008-0000-0100-000003000000}"/>
+                <a16:creationId xmlns:xdr="http://schemas.openxmlformats.org/drawingml/2006/spreadsheetDrawing" xmlns:a16="http://schemas.microsoft.com/office/drawing/2014/main" xmlns="" xmlns:lc="http://schemas.openxmlformats.org/drawingml/2006/lockedCanvas" id="{00000000-0008-0000-0100-000003000000}"/>
               </a:ext>
             </a:extLst>
           </p:cNvPr>
@@ -29172,7 +29092,7 @@
           <p:cNvPr id="5" name="Chart 4">
             <a:extLst>
               <a:ext uri="{FF2B5EF4-FFF2-40B4-BE49-F238E27FC236}">
-                <a16:creationId xmlns:lc="http://schemas.openxmlformats.org/drawingml/2006/lockedCanvas" xmlns="" xmlns:a16="http://schemas.microsoft.com/office/drawing/2014/main" xmlns:xdr="http://schemas.openxmlformats.org/drawingml/2006/spreadsheetDrawing" id="{00000000-0008-0000-0100-000003000000}"/>
+                <a16:creationId xmlns:xdr="http://schemas.openxmlformats.org/drawingml/2006/spreadsheetDrawing" xmlns:a16="http://schemas.microsoft.com/office/drawing/2014/main" xmlns="" xmlns:lc="http://schemas.openxmlformats.org/drawingml/2006/lockedCanvas" id="{00000000-0008-0000-0100-000003000000}"/>
               </a:ext>
             </a:extLst>
           </p:cNvPr>
@@ -29445,7 +29365,7 @@
           <p:cNvPr id="5" name="Chart 4">
             <a:extLst>
               <a:ext uri="{FF2B5EF4-FFF2-40B4-BE49-F238E27FC236}">
-                <a16:creationId xmlns:lc="http://schemas.openxmlformats.org/drawingml/2006/lockedCanvas" xmlns="" xmlns:a16="http://schemas.microsoft.com/office/drawing/2014/main" xmlns:xdr="http://schemas.openxmlformats.org/drawingml/2006/spreadsheetDrawing" id="{00000000-0008-0000-0100-000003000000}"/>
+                <a16:creationId xmlns:xdr="http://schemas.openxmlformats.org/drawingml/2006/spreadsheetDrawing" xmlns:a16="http://schemas.microsoft.com/office/drawing/2014/main" xmlns="" xmlns:lc="http://schemas.openxmlformats.org/drawingml/2006/lockedCanvas" id="{00000000-0008-0000-0100-000003000000}"/>
               </a:ext>
             </a:extLst>
           </p:cNvPr>
@@ -29475,7 +29395,7 @@
           <p:cNvPr id="7" name="Chart 6">
             <a:extLst>
               <a:ext uri="{FF2B5EF4-FFF2-40B4-BE49-F238E27FC236}">
-                <a16:creationId xmlns:lc="http://schemas.openxmlformats.org/drawingml/2006/lockedCanvas" xmlns="" xmlns:a16="http://schemas.microsoft.com/office/drawing/2014/main" xmlns:xdr="http://schemas.openxmlformats.org/drawingml/2006/spreadsheetDrawing" id="{00000000-0008-0000-0100-000003000000}"/>
+                <a16:creationId xmlns:xdr="http://schemas.openxmlformats.org/drawingml/2006/spreadsheetDrawing" xmlns:a16="http://schemas.microsoft.com/office/drawing/2014/main" xmlns="" xmlns:lc="http://schemas.openxmlformats.org/drawingml/2006/lockedCanvas" id="{00000000-0008-0000-0100-000003000000}"/>
               </a:ext>
             </a:extLst>
           </p:cNvPr>
@@ -30131,7 +30051,7 @@
           <p:cNvPr id="11" name="Chart 10">
             <a:extLst>
               <a:ext uri="{FF2B5EF4-FFF2-40B4-BE49-F238E27FC236}">
-                <a16:creationId xmlns:lc="http://schemas.openxmlformats.org/drawingml/2006/lockedCanvas" xmlns="" xmlns:a16="http://schemas.microsoft.com/office/drawing/2014/main" xmlns:xdr="http://schemas.openxmlformats.org/drawingml/2006/spreadsheetDrawing" id="{00000000-0008-0000-0100-000003000000}"/>
+                <a16:creationId xmlns:xdr="http://schemas.openxmlformats.org/drawingml/2006/spreadsheetDrawing" xmlns:a16="http://schemas.microsoft.com/office/drawing/2014/main" xmlns="" xmlns:lc="http://schemas.openxmlformats.org/drawingml/2006/lockedCanvas" id="{00000000-0008-0000-0100-000003000000}"/>
               </a:ext>
             </a:extLst>
           </p:cNvPr>
@@ -30161,7 +30081,7 @@
           <p:cNvPr id="12" name="Chart 11">
             <a:extLst>
               <a:ext uri="{FF2B5EF4-FFF2-40B4-BE49-F238E27FC236}">
-                <a16:creationId xmlns:lc="http://schemas.openxmlformats.org/drawingml/2006/lockedCanvas" xmlns="" xmlns:a16="http://schemas.microsoft.com/office/drawing/2014/main" xmlns:xdr="http://schemas.openxmlformats.org/drawingml/2006/spreadsheetDrawing" id="{00000000-0008-0000-0100-000003000000}"/>
+                <a16:creationId xmlns:xdr="http://schemas.openxmlformats.org/drawingml/2006/spreadsheetDrawing" xmlns:a16="http://schemas.microsoft.com/office/drawing/2014/main" xmlns="" xmlns:lc="http://schemas.openxmlformats.org/drawingml/2006/lockedCanvas" id="{00000000-0008-0000-0100-000003000000}"/>
               </a:ext>
             </a:extLst>
           </p:cNvPr>
@@ -30891,6 +30811,13 @@
   <p:clrMapOvr>
     <a:masterClrMapping/>
   </p:clrMapOvr>
+  <p:timing>
+    <p:tnLst>
+      <p:par>
+        <p:cTn id="1" dur="indefinite" restart="never" nodeType="tmRoot"/>
+      </p:par>
+    </p:tnLst>
+  </p:timing>
 </p:sld>
 </file>
 
@@ -30939,7 +30866,7 @@
           <p:cNvPr id="4" name="Chart 3">
             <a:extLst>
               <a:ext uri="{FF2B5EF4-FFF2-40B4-BE49-F238E27FC236}">
-                <a16:creationId xmlns:lc="http://schemas.openxmlformats.org/drawingml/2006/lockedCanvas" xmlns="" xmlns:a16="http://schemas.microsoft.com/office/drawing/2014/main" xmlns:xdr="http://schemas.openxmlformats.org/drawingml/2006/spreadsheetDrawing" id="{00000000-0008-0000-0100-000003000000}"/>
+                <a16:creationId xmlns:xdr="http://schemas.openxmlformats.org/drawingml/2006/spreadsheetDrawing" xmlns:a16="http://schemas.microsoft.com/office/drawing/2014/main" xmlns="" xmlns:lc="http://schemas.openxmlformats.org/drawingml/2006/lockedCanvas" id="{00000000-0008-0000-0100-000003000000}"/>
               </a:ext>
             </a:extLst>
           </p:cNvPr>
@@ -30965,7 +30892,7 @@
           <p:cNvPr id="5" name="Chart 4">
             <a:extLst>
               <a:ext uri="{FF2B5EF4-FFF2-40B4-BE49-F238E27FC236}">
-                <a16:creationId xmlns:lc="http://schemas.openxmlformats.org/drawingml/2006/lockedCanvas" xmlns="" xmlns:a16="http://schemas.microsoft.com/office/drawing/2014/main" xmlns:xdr="http://schemas.openxmlformats.org/drawingml/2006/spreadsheetDrawing" id="{00000000-0008-0000-0100-000003000000}"/>
+                <a16:creationId xmlns:xdr="http://schemas.openxmlformats.org/drawingml/2006/spreadsheetDrawing" xmlns:a16="http://schemas.microsoft.com/office/drawing/2014/main" xmlns="" xmlns:lc="http://schemas.openxmlformats.org/drawingml/2006/lockedCanvas" id="{00000000-0008-0000-0100-000003000000}"/>
               </a:ext>
             </a:extLst>
           </p:cNvPr>
@@ -31056,6 +30983,13 @@
   <p:clrMapOvr>
     <a:masterClrMapping/>
   </p:clrMapOvr>
+  <p:timing>
+    <p:tnLst>
+      <p:par>
+        <p:cTn id="1" dur="indefinite" restart="never" nodeType="tmRoot"/>
+      </p:par>
+    </p:tnLst>
+  </p:timing>
 </p:sld>
 </file>
 
@@ -31230,7 +31164,7 @@
           <p:cNvPr id="5" name="Chart 4">
             <a:extLst>
               <a:ext uri="{FF2B5EF4-FFF2-40B4-BE49-F238E27FC236}">
-                <a16:creationId xmlns:lc="http://schemas.openxmlformats.org/drawingml/2006/lockedCanvas" xmlns="" xmlns:a16="http://schemas.microsoft.com/office/drawing/2014/main" xmlns:xdr="http://schemas.openxmlformats.org/drawingml/2006/spreadsheetDrawing" id="{00000000-0008-0000-0100-000003000000}"/>
+                <a16:creationId xmlns:xdr="http://schemas.openxmlformats.org/drawingml/2006/spreadsheetDrawing" xmlns:a16="http://schemas.microsoft.com/office/drawing/2014/main" xmlns="" xmlns:lc="http://schemas.openxmlformats.org/drawingml/2006/lockedCanvas" id="{00000000-0008-0000-0100-000003000000}"/>
               </a:ext>
             </a:extLst>
           </p:cNvPr>
@@ -31260,7 +31194,7 @@
           <p:cNvPr id="6" name="Chart 5">
             <a:extLst>
               <a:ext uri="{FF2B5EF4-FFF2-40B4-BE49-F238E27FC236}">
-                <a16:creationId xmlns:lc="http://schemas.openxmlformats.org/drawingml/2006/lockedCanvas" xmlns="" xmlns:a16="http://schemas.microsoft.com/office/drawing/2014/main" xmlns:xdr="http://schemas.openxmlformats.org/drawingml/2006/spreadsheetDrawing" id="{00000000-0008-0000-0100-000003000000}"/>
+                <a16:creationId xmlns:xdr="http://schemas.openxmlformats.org/drawingml/2006/spreadsheetDrawing" xmlns:a16="http://schemas.microsoft.com/office/drawing/2014/main" xmlns="" xmlns:lc="http://schemas.openxmlformats.org/drawingml/2006/lockedCanvas" id="{00000000-0008-0000-0100-000003000000}"/>
               </a:ext>
             </a:extLst>
           </p:cNvPr>
@@ -31603,7 +31537,7 @@
           <p:cNvPr id="8" name="Chart 7">
             <a:extLst>
               <a:ext uri="{FF2B5EF4-FFF2-40B4-BE49-F238E27FC236}">
-                <a16:creationId xmlns:lc="http://schemas.openxmlformats.org/drawingml/2006/lockedCanvas" xmlns="" xmlns:a16="http://schemas.microsoft.com/office/drawing/2014/main" xmlns:xdr="http://schemas.openxmlformats.org/drawingml/2006/spreadsheetDrawing" id="{00000000-0008-0000-0100-000003000000}"/>
+                <a16:creationId xmlns:xdr="http://schemas.openxmlformats.org/drawingml/2006/spreadsheetDrawing" xmlns:a16="http://schemas.microsoft.com/office/drawing/2014/main" xmlns="" xmlns:lc="http://schemas.openxmlformats.org/drawingml/2006/lockedCanvas" id="{00000000-0008-0000-0100-000003000000}"/>
               </a:ext>
             </a:extLst>
           </p:cNvPr>
@@ -31946,7 +31880,7 @@
           <p:cNvPr id="10" name="Chart 9">
             <a:extLst>
               <a:ext uri="{FF2B5EF4-FFF2-40B4-BE49-F238E27FC236}">
-                <a16:creationId xmlns:lc="http://schemas.openxmlformats.org/drawingml/2006/lockedCanvas" xmlns="" xmlns:a16="http://schemas.microsoft.com/office/drawing/2014/main" xmlns:xdr="http://schemas.openxmlformats.org/drawingml/2006/spreadsheetDrawing" id="{00000000-0008-0000-0100-000003000000}"/>
+                <a16:creationId xmlns:xdr="http://schemas.openxmlformats.org/drawingml/2006/spreadsheetDrawing" xmlns:a16="http://schemas.microsoft.com/office/drawing/2014/main" xmlns="" xmlns:lc="http://schemas.openxmlformats.org/drawingml/2006/lockedCanvas" id="{00000000-0008-0000-0100-000003000000}"/>
               </a:ext>
             </a:extLst>
           </p:cNvPr>
@@ -32322,6 +32256,13 @@
   <p:clrMapOvr>
     <a:masterClrMapping/>
   </p:clrMapOvr>
+  <p:timing>
+    <p:tnLst>
+      <p:par>
+        <p:cTn id="1" dur="indefinite" restart="never" nodeType="tmRoot"/>
+      </p:par>
+    </p:tnLst>
+  </p:timing>
 </p:sld>
 </file>
 
@@ -32786,6 +32727,13 @@
   <p:clrMapOvr>
     <a:masterClrMapping/>
   </p:clrMapOvr>
+  <p:timing>
+    <p:tnLst>
+      <p:par>
+        <p:cTn id="1" dur="indefinite" restart="never" nodeType="tmRoot"/>
+      </p:par>
+    </p:tnLst>
+  </p:timing>
 </p:sld>
 </file>
 
@@ -33167,8 +33115,8 @@
           </a:p>
         </p:txBody>
       </p:sp>
-      <mc:AlternateContent xmlns:mc="http://schemas.openxmlformats.org/markup-compatibility/2006">
-        <mc:Choice xmlns:a14="http://schemas.microsoft.com/office/drawing/2010/main" Requires="a14">
+      <mc:AlternateContent xmlns:mc="http://schemas.openxmlformats.org/markup-compatibility/2006" xmlns:a14="http://schemas.microsoft.com/office/drawing/2010/main">
+        <mc:Choice Requires="a14">
           <p:sp>
             <p:nvSpPr>
               <p:cNvPr id="3" name="Content Placeholder 2"/>
@@ -34137,7 +34085,7 @@
             </p:txBody>
           </p:sp>
         </mc:Choice>
-        <mc:Fallback>
+        <mc:Fallback xmlns="">
           <p:sp>
             <p:nvSpPr>
               <p:cNvPr id="3" name="Content Placeholder 2"/>
@@ -34233,8 +34181,8 @@
           </a:p>
         </p:txBody>
       </p:sp>
-      <mc:AlternateContent xmlns:mc="http://schemas.openxmlformats.org/markup-compatibility/2006">
-        <mc:Choice xmlns:a14="http://schemas.microsoft.com/office/drawing/2010/main" Requires="a14">
+      <mc:AlternateContent xmlns:mc="http://schemas.openxmlformats.org/markup-compatibility/2006" xmlns:a14="http://schemas.microsoft.com/office/drawing/2010/main">
+        <mc:Choice Requires="a14">
           <p:sp>
             <p:nvSpPr>
               <p:cNvPr id="7" name="TextBox 6"/>
@@ -34446,7 +34394,7 @@
             </p:txBody>
           </p:sp>
         </mc:Choice>
-        <mc:Fallback>
+        <mc:Fallback xmlns="">
           <p:sp>
             <p:nvSpPr>
               <p:cNvPr id="7" name="TextBox 6"/>
@@ -34485,8 +34433,8 @@
           </p:sp>
         </mc:Fallback>
       </mc:AlternateContent>
-      <mc:AlternateContent xmlns:mc="http://schemas.openxmlformats.org/markup-compatibility/2006">
-        <mc:Choice xmlns:a14="http://schemas.microsoft.com/office/drawing/2010/main" Requires="a14">
+      <mc:AlternateContent xmlns:mc="http://schemas.openxmlformats.org/markup-compatibility/2006" xmlns:a14="http://schemas.microsoft.com/office/drawing/2010/main">
+        <mc:Choice Requires="a14">
           <p:sp>
             <p:nvSpPr>
               <p:cNvPr id="8" name="Rectangle 7"/>
@@ -34702,7 +34650,7 @@
             </p:txBody>
           </p:sp>
         </mc:Choice>
-        <mc:Fallback>
+        <mc:Fallback xmlns="">
           <p:sp>
             <p:nvSpPr>
               <p:cNvPr id="8" name="Rectangle 7"/>
@@ -34859,8 +34807,8 @@
           </a:prstGeom>
         </p:spPr>
       </p:pic>
-      <mc:AlternateContent xmlns:mc="http://schemas.openxmlformats.org/markup-compatibility/2006">
-        <mc:Choice xmlns:a14="http://schemas.microsoft.com/office/drawing/2010/main" Requires="a14">
+      <mc:AlternateContent xmlns:mc="http://schemas.openxmlformats.org/markup-compatibility/2006" xmlns:a14="http://schemas.microsoft.com/office/drawing/2010/main">
+        <mc:Choice Requires="a14">
           <p:sp>
             <p:nvSpPr>
               <p:cNvPr id="9" name="TextBox 8"/>
@@ -35072,7 +35020,7 @@
             </p:txBody>
           </p:sp>
         </mc:Choice>
-        <mc:Fallback>
+        <mc:Fallback xmlns="">
           <p:sp>
             <p:nvSpPr>
               <p:cNvPr id="9" name="TextBox 8"/>
@@ -35111,8 +35059,8 @@
           </p:sp>
         </mc:Fallback>
       </mc:AlternateContent>
-      <mc:AlternateContent xmlns:mc="http://schemas.openxmlformats.org/markup-compatibility/2006">
-        <mc:Choice xmlns:a14="http://schemas.microsoft.com/office/drawing/2010/main" Requires="a14">
+      <mc:AlternateContent xmlns:mc="http://schemas.openxmlformats.org/markup-compatibility/2006" xmlns:a14="http://schemas.microsoft.com/office/drawing/2010/main">
+        <mc:Choice Requires="a14">
           <p:sp>
             <p:nvSpPr>
               <p:cNvPr id="10" name="Rectangle 9"/>
@@ -35261,7 +35209,7 @@
             </p:txBody>
           </p:sp>
         </mc:Choice>
-        <mc:Fallback>
+        <mc:Fallback xmlns="">
           <p:sp>
             <p:nvSpPr>
               <p:cNvPr id="10" name="Rectangle 9"/>
@@ -35300,8 +35248,8 @@
           </p:sp>
         </mc:Fallback>
       </mc:AlternateContent>
-      <mc:AlternateContent xmlns:mc="http://schemas.openxmlformats.org/markup-compatibility/2006">
-        <mc:Choice xmlns:a14="http://schemas.microsoft.com/office/drawing/2010/main" Requires="a14">
+      <mc:AlternateContent xmlns:mc="http://schemas.openxmlformats.org/markup-compatibility/2006" xmlns:a14="http://schemas.microsoft.com/office/drawing/2010/main">
+        <mc:Choice Requires="a14">
           <p:sp>
             <p:nvSpPr>
               <p:cNvPr id="11" name="Rectangle 10"/>
@@ -35456,7 +35404,7 @@
             </p:txBody>
           </p:sp>
         </mc:Choice>
-        <mc:Fallback>
+        <mc:Fallback xmlns="">
           <p:sp>
             <p:nvSpPr>
               <p:cNvPr id="11" name="Rectangle 10"/>
@@ -35495,8 +35443,8 @@
           </p:sp>
         </mc:Fallback>
       </mc:AlternateContent>
-      <mc:AlternateContent xmlns:mc="http://schemas.openxmlformats.org/markup-compatibility/2006">
-        <mc:Choice xmlns:a14="http://schemas.microsoft.com/office/drawing/2010/main" Requires="a14">
+      <mc:AlternateContent xmlns:mc="http://schemas.openxmlformats.org/markup-compatibility/2006" xmlns:a14="http://schemas.microsoft.com/office/drawing/2010/main">
+        <mc:Choice Requires="a14">
           <p:sp>
             <p:nvSpPr>
               <p:cNvPr id="13" name="Rectangle 12"/>
@@ -35651,7 +35599,7 @@
             </p:txBody>
           </p:sp>
         </mc:Choice>
-        <mc:Fallback>
+        <mc:Fallback xmlns="">
           <p:sp>
             <p:nvSpPr>
               <p:cNvPr id="13" name="Rectangle 12"/>
@@ -35700,6 +35648,405 @@
   <p:clrMapOvr>
     <a:masterClrMapping/>
   </p:clrMapOvr>
+  <p:timing>
+    <p:tnLst>
+      <p:par>
+        <p:cTn id="1" dur="indefinite" restart="never" nodeType="tmRoot"/>
+      </p:par>
+    </p:tnLst>
+  </p:timing>
+</p:sld>
+</file>
+
+<file path=ppt/slides/slide24.xml><?xml version="1.0" encoding="utf-8"?>
+<p:sld xmlns:a="http://schemas.openxmlformats.org/drawingml/2006/main" xmlns:r="http://schemas.openxmlformats.org/officeDocument/2006/relationships" xmlns:p="http://schemas.openxmlformats.org/presentationml/2006/main">
+  <p:cSld>
+    <p:spTree>
+      <p:nvGrpSpPr>
+        <p:cNvPr id="1" name=""/>
+        <p:cNvGrpSpPr/>
+        <p:nvPr/>
+      </p:nvGrpSpPr>
+      <p:grpSpPr>
+        <a:xfrm>
+          <a:off x="0" y="0"/>
+          <a:ext cx="0" cy="0"/>
+          <a:chOff x="0" y="0"/>
+          <a:chExt cx="0" cy="0"/>
+        </a:xfrm>
+      </p:grpSpPr>
+      <p:sp>
+        <p:nvSpPr>
+          <p:cNvPr id="5" name="Title 4"/>
+          <p:cNvSpPr>
+            <a:spLocks noGrp="1"/>
+          </p:cNvSpPr>
+          <p:nvPr>
+            <p:ph type="title"/>
+          </p:nvPr>
+        </p:nvSpPr>
+        <p:spPr/>
+        <p:txBody>
+          <a:bodyPr/>
+          <a:lstStyle/>
+          <a:p>
+            <a:r>
+              <a:rPr lang="en-US" dirty="0" smtClean="0"/>
+              <a:t>Economics</a:t>
+            </a:r>
+            <a:endParaRPr lang="en-US" dirty="0"/>
+          </a:p>
+        </p:txBody>
+      </p:sp>
+      <p:sp>
+        <p:nvSpPr>
+          <p:cNvPr id="6" name="Content Placeholder 5"/>
+          <p:cNvSpPr>
+            <a:spLocks noGrp="1"/>
+          </p:cNvSpPr>
+          <p:nvPr>
+            <p:ph sz="half" idx="1"/>
+          </p:nvPr>
+        </p:nvSpPr>
+        <p:spPr/>
+        <p:txBody>
+          <a:bodyPr/>
+          <a:lstStyle/>
+          <a:p>
+            <a:r>
+              <a:rPr lang="en-US" dirty="0" smtClean="0"/>
+              <a:t>Look at “real </a:t>
+            </a:r>
+            <a:r>
+              <a:rPr lang="en-US" dirty="0" err="1" smtClean="0"/>
+              <a:t>levelized</a:t>
+            </a:r>
+            <a:r>
+              <a:rPr lang="en-US" dirty="0" smtClean="0"/>
+              <a:t> cost” analysis</a:t>
+            </a:r>
+          </a:p>
+          <a:p>
+            <a:pPr lvl="1"/>
+            <a:r>
+              <a:rPr lang="en-US" dirty="0" smtClean="0"/>
+              <a:t>Analysis methodology well established</a:t>
+            </a:r>
+          </a:p>
+          <a:p>
+            <a:r>
+              <a:rPr lang="en-US" dirty="0" smtClean="0"/>
+              <a:t>Compare to standard LWRs as well as other forms of power</a:t>
+            </a:r>
+          </a:p>
+          <a:p>
+            <a:r>
+              <a:rPr lang="en-US" dirty="0" smtClean="0"/>
+              <a:t>Ensure viability</a:t>
+            </a:r>
+          </a:p>
+          <a:p>
+            <a:pPr lvl="1"/>
+            <a:r>
+              <a:rPr lang="en-US" dirty="0" smtClean="0"/>
+              <a:t>Constrain fuel properties</a:t>
+            </a:r>
+          </a:p>
+          <a:p>
+            <a:pPr lvl="1"/>
+            <a:endParaRPr lang="en-US" dirty="0"/>
+          </a:p>
+        </p:txBody>
+      </p:sp>
+      <p:sp>
+        <p:nvSpPr>
+          <p:cNvPr id="4" name="Slide Number Placeholder 3"/>
+          <p:cNvSpPr>
+            <a:spLocks noGrp="1"/>
+          </p:cNvSpPr>
+          <p:nvPr>
+            <p:ph type="sldNum" sz="quarter" idx="12"/>
+          </p:nvPr>
+        </p:nvSpPr>
+        <p:spPr/>
+        <p:txBody>
+          <a:bodyPr/>
+          <a:lstStyle/>
+          <a:p>
+            <a:pPr>
+              <a:defRPr/>
+            </a:pPr>
+            <a:fld id="{639E97B8-4532-408E-A5F7-ACF05B64D361}" type="slidenum">
+              <a:rPr lang="en-US" smtClean="0"/>
+              <a:pPr>
+                <a:defRPr/>
+              </a:pPr>
+              <a:t>24</a:t>
+            </a:fld>
+            <a:endParaRPr lang="en-US" dirty="0"/>
+          </a:p>
+        </p:txBody>
+      </p:sp>
+      <p:pic>
+        <p:nvPicPr>
+          <p:cNvPr id="14" name="Content Placeholder 13"/>
+          <p:cNvPicPr>
+            <a:picLocks noGrp="1" noChangeAspect="1"/>
+          </p:cNvPicPr>
+          <p:nvPr>
+            <p:ph sz="half" idx="2"/>
+          </p:nvPr>
+        </p:nvPicPr>
+        <p:blipFill>
+          <a:blip r:embed="rId2">
+            <a:extLst>
+              <a:ext uri="{28A0092B-C50C-407E-A947-70E740481C1C}">
+                <a14:useLocalDpi xmlns:a14="http://schemas.microsoft.com/office/drawing/2010/main" val="0"/>
+              </a:ext>
+            </a:extLst>
+          </a:blip>
+          <a:stretch>
+            <a:fillRect/>
+          </a:stretch>
+        </p:blipFill>
+        <p:spPr>
+          <a:xfrm>
+            <a:off x="4647894" y="1295400"/>
+            <a:ext cx="3657906" cy="4525963"/>
+          </a:xfrm>
+          <a:prstGeom prst="rect">
+            <a:avLst/>
+          </a:prstGeom>
+          <a:ln>
+            <a:noFill/>
+          </a:ln>
+          <a:effectLst>
+            <a:outerShdw blurRad="292100" dist="139700" dir="2700000" algn="tl" rotWithShape="0">
+              <a:srgbClr val="333333">
+                <a:alpha val="65000"/>
+              </a:srgbClr>
+            </a:outerShdw>
+          </a:effectLst>
+        </p:spPr>
+      </p:pic>
+    </p:spTree>
+    <p:extLst>
+      <p:ext uri="{BB962C8B-B14F-4D97-AF65-F5344CB8AC3E}">
+        <p14:creationId xmlns:p14="http://schemas.microsoft.com/office/powerpoint/2010/main" val="3390168875"/>
+      </p:ext>
+    </p:extLst>
+  </p:cSld>
+  <p:clrMapOvr>
+    <a:masterClrMapping/>
+  </p:clrMapOvr>
+  <p:timing>
+    <p:tnLst>
+      <p:par>
+        <p:cTn id="1" dur="indefinite" restart="never" nodeType="tmRoot"/>
+      </p:par>
+    </p:tnLst>
+  </p:timing>
+</p:sld>
+</file>
+
+<file path=ppt/slides/slide25.xml><?xml version="1.0" encoding="utf-8"?>
+<p:sld xmlns:a="http://schemas.openxmlformats.org/drawingml/2006/main" xmlns:r="http://schemas.openxmlformats.org/officeDocument/2006/relationships" xmlns:p="http://schemas.openxmlformats.org/presentationml/2006/main">
+  <p:cSld>
+    <p:spTree>
+      <p:nvGrpSpPr>
+        <p:cNvPr id="1" name=""/>
+        <p:cNvGrpSpPr/>
+        <p:nvPr/>
+      </p:nvGrpSpPr>
+      <p:grpSpPr>
+        <a:xfrm>
+          <a:off x="0" y="0"/>
+          <a:ext cx="0" cy="0"/>
+          <a:chOff x="0" y="0"/>
+          <a:chExt cx="0" cy="0"/>
+        </a:xfrm>
+      </p:grpSpPr>
+      <p:sp>
+        <p:nvSpPr>
+          <p:cNvPr id="2" name="Title 1"/>
+          <p:cNvSpPr>
+            <a:spLocks noGrp="1"/>
+          </p:cNvSpPr>
+          <p:nvPr>
+            <p:ph type="title"/>
+          </p:nvPr>
+        </p:nvSpPr>
+        <p:spPr/>
+        <p:txBody>
+          <a:bodyPr/>
+          <a:lstStyle/>
+          <a:p>
+            <a:r>
+              <a:rPr lang="en-US" dirty="0" smtClean="0"/>
+              <a:t>Further Investigation</a:t>
+            </a:r>
+            <a:endParaRPr lang="en-US" dirty="0"/>
+          </a:p>
+        </p:txBody>
+      </p:sp>
+      <p:sp>
+        <p:nvSpPr>
+          <p:cNvPr id="3" name="Content Placeholder 2"/>
+          <p:cNvSpPr>
+            <a:spLocks noGrp="1"/>
+          </p:cNvSpPr>
+          <p:nvPr>
+            <p:ph sz="half" idx="1"/>
+          </p:nvPr>
+        </p:nvSpPr>
+        <p:spPr/>
+        <p:txBody>
+          <a:bodyPr/>
+          <a:lstStyle/>
+          <a:p>
+            <a:r>
+              <a:rPr lang="en-US" dirty="0" smtClean="0"/>
+              <a:t>Look at impact of industrial heat usage</a:t>
+            </a:r>
+          </a:p>
+          <a:p>
+            <a:pPr lvl="1"/>
+            <a:r>
+              <a:rPr lang="en-US" dirty="0" smtClean="0"/>
+              <a:t>High temp vs low temp</a:t>
+            </a:r>
+          </a:p>
+          <a:p>
+            <a:r>
+              <a:rPr lang="en-US" dirty="0" smtClean="0"/>
+              <a:t>Ensure model efficacy</a:t>
+            </a:r>
+          </a:p>
+          <a:p>
+            <a:pPr lvl="1"/>
+            <a:r>
+              <a:rPr lang="en-US" dirty="0" smtClean="0"/>
+              <a:t>SMRs</a:t>
+            </a:r>
+          </a:p>
+          <a:p>
+            <a:pPr lvl="2"/>
+            <a:r>
+              <a:rPr lang="en-US" dirty="0" smtClean="0"/>
+              <a:t>Construction</a:t>
+            </a:r>
+          </a:p>
+          <a:p>
+            <a:pPr lvl="2"/>
+            <a:r>
+              <a:rPr lang="en-US" dirty="0" smtClean="0"/>
+              <a:t>Lifetime</a:t>
+            </a:r>
+          </a:p>
+          <a:p>
+            <a:pPr lvl="2"/>
+            <a:r>
+              <a:rPr lang="en-US" dirty="0" smtClean="0"/>
+              <a:t>Capacity factors</a:t>
+            </a:r>
+          </a:p>
+          <a:p>
+            <a:pPr lvl="1"/>
+            <a:r>
+              <a:rPr lang="en-US" dirty="0" smtClean="0"/>
+              <a:t>Fuel</a:t>
+            </a:r>
+          </a:p>
+          <a:p>
+            <a:pPr lvl="1"/>
+            <a:endParaRPr lang="en-US" dirty="0" smtClean="0"/>
+          </a:p>
+          <a:p>
+            <a:endParaRPr lang="en-US" dirty="0" smtClean="0"/>
+          </a:p>
+          <a:p>
+            <a:pPr marL="0" indent="0">
+              <a:buNone/>
+            </a:pPr>
+            <a:endParaRPr lang="en-US" dirty="0"/>
+          </a:p>
+        </p:txBody>
+      </p:sp>
+      <p:pic>
+        <p:nvPicPr>
+          <p:cNvPr id="6" name="Content Placeholder 5"/>
+          <p:cNvPicPr>
+            <a:picLocks noGrp="1" noChangeAspect="1"/>
+          </p:cNvPicPr>
+          <p:nvPr>
+            <p:ph sz="half" idx="2"/>
+          </p:nvPr>
+        </p:nvPicPr>
+        <p:blipFill>
+          <a:blip r:embed="rId2">
+            <a:extLst>
+              <a:ext uri="{28A0092B-C50C-407E-A947-70E740481C1C}">
+                <a14:useLocalDpi xmlns:a14="http://schemas.microsoft.com/office/drawing/2010/main" val="0"/>
+              </a:ext>
+            </a:extLst>
+          </a:blip>
+          <a:stretch>
+            <a:fillRect/>
+          </a:stretch>
+        </p:blipFill>
+        <p:spPr>
+          <a:xfrm>
+            <a:off x="4648200" y="2133600"/>
+            <a:ext cx="4038600" cy="3010740"/>
+          </a:xfrm>
+        </p:spPr>
+      </p:pic>
+      <p:sp>
+        <p:nvSpPr>
+          <p:cNvPr id="5" name="Slide Number Placeholder 4"/>
+          <p:cNvSpPr>
+            <a:spLocks noGrp="1"/>
+          </p:cNvSpPr>
+          <p:nvPr>
+            <p:ph type="sldNum" sz="quarter" idx="12"/>
+          </p:nvPr>
+        </p:nvSpPr>
+        <p:spPr/>
+        <p:txBody>
+          <a:bodyPr/>
+          <a:lstStyle/>
+          <a:p>
+            <a:pPr>
+              <a:defRPr/>
+            </a:pPr>
+            <a:fld id="{56039845-206E-4D43-9E5F-DD43C0647861}" type="slidenum">
+              <a:rPr lang="en-US" smtClean="0"/>
+              <a:pPr>
+                <a:defRPr/>
+              </a:pPr>
+              <a:t>25</a:t>
+            </a:fld>
+            <a:endParaRPr lang="en-US" dirty="0"/>
+          </a:p>
+        </p:txBody>
+      </p:sp>
+    </p:spTree>
+    <p:extLst>
+      <p:ext uri="{BB962C8B-B14F-4D97-AF65-F5344CB8AC3E}">
+        <p14:creationId xmlns:p14="http://schemas.microsoft.com/office/powerpoint/2010/main" val="1219425013"/>
+      </p:ext>
+    </p:extLst>
+  </p:cSld>
+  <p:clrMapOvr>
+    <a:masterClrMapping/>
+  </p:clrMapOvr>
+  <p:timing>
+    <p:tnLst>
+      <p:par>
+        <p:cTn id="1" dur="indefinite" restart="never" nodeType="tmRoot"/>
+      </p:par>
+    </p:tnLst>
+  </p:timing>
 </p:sld>
 </file>
 
@@ -36453,11 +36800,7 @@
           <a:p>
             <a:r>
               <a:rPr lang="en-US" dirty="0" smtClean="0"/>
-              <a:t>What’s </a:t>
-            </a:r>
-            <a:r>
-              <a:rPr lang="en-US" dirty="0" smtClean="0"/>
-              <a:t>next for depletion?</a:t>
+              <a:t>What’s next for depletion?</a:t>
             </a:r>
             <a:endParaRPr lang="en-US" dirty="0"/>
           </a:p>

</xml_diff>